<commit_message>
minor changes in presentation
</commit_message>
<xml_diff>
--- a/res/HeartRateMonitor.pptx
+++ b/res/HeartRateMonitor.pptx
@@ -16198,7 +16198,15 @@
             </a:r>
             <a:r>
               <a:rPr lang="de-DE" dirty="0" err="1" smtClean="0"/>
-              <a:t>peaks</a:t>
+              <a:t>maxima</a:t>
+            </a:r>
+            <a:r>
+              <a:rPr lang="de-DE" dirty="0" smtClean="0"/>
+              <a:t> / </a:t>
+            </a:r>
+            <a:r>
+              <a:rPr lang="de-DE" dirty="0" err="1" smtClean="0"/>
+              <a:t>minima</a:t>
             </a:r>
             <a:endParaRPr lang="de-DE" dirty="0" smtClean="0"/>
           </a:p>
@@ -16263,8 +16271,8 @@
         </p:nvSpPr>
         <p:spPr>
           <a:xfrm>
-            <a:off x="971600" y="6021288"/>
-            <a:ext cx="7200800" cy="523220"/>
+            <a:off x="431540" y="6021288"/>
+            <a:ext cx="8280920" cy="523220"/>
           </a:xfrm>
           <a:prstGeom prst="rect">
             <a:avLst/>
@@ -16292,7 +16300,11 @@
           <a:p>
             <a:r>
               <a:rPr lang="en-US" sz="2800" dirty="0" smtClean="0"/>
-              <a:t>Detect minima </a:t>
+              <a:t>Detect </a:t>
+            </a:r>
+            <a:r>
+              <a:rPr lang="en-US" sz="2800" dirty="0" smtClean="0"/>
+              <a:t>maxima / minima </a:t>
             </a:r>
             <a:r>
               <a:rPr lang="en-US" sz="2800" dirty="0"/>
@@ -16378,8 +16390,8 @@
         </p:nvSpPr>
         <p:spPr>
           <a:xfrm>
-            <a:off x="457200" y="1484784"/>
-            <a:ext cx="6347048" cy="836512"/>
+            <a:off x="457200" y="1484783"/>
+            <a:ext cx="6347048" cy="1872209"/>
           </a:xfrm>
         </p:spPr>
         <p:txBody>
@@ -16414,6 +16426,32 @@
             <a:r>
               <a:rPr lang="de-DE" sz="2000" dirty="0" err="1" smtClean="0"/>
               <a:t>Photodiode</a:t>
+            </a:r>
+            <a:endParaRPr lang="de-DE" sz="2000" dirty="0" smtClean="0"/>
+          </a:p>
+          <a:p>
+            <a:pPr lvl="1"/>
+            <a:r>
+              <a:rPr lang="en-US" sz="2000" dirty="0" smtClean="0"/>
+              <a:t>Different integration times</a:t>
+            </a:r>
+          </a:p>
+          <a:p>
+            <a:pPr lvl="1"/>
+            <a:r>
+              <a:rPr lang="en-US" sz="2000" dirty="0" smtClean="0"/>
+              <a:t>Different </a:t>
+            </a:r>
+            <a:r>
+              <a:rPr lang="en-US" sz="2000" dirty="0" smtClean="0"/>
+              <a:t>sensitivity</a:t>
+            </a:r>
+          </a:p>
+          <a:p>
+            <a:pPr lvl="1"/>
+            <a:r>
+              <a:rPr lang="en-US" sz="2000" dirty="0" smtClean="0"/>
+              <a:t>I2C interface</a:t>
             </a:r>
             <a:endParaRPr lang="en-US" sz="2000" dirty="0"/>
           </a:p>
@@ -16429,7 +16467,7 @@
         </p:nvSpPr>
         <p:spPr>
           <a:xfrm>
-            <a:off x="457200" y="2593503"/>
+            <a:off x="457200" y="3491474"/>
             <a:ext cx="6347048" cy="604664"/>
           </a:xfrm>
           <a:prstGeom prst="rect">
@@ -16608,7 +16646,7 @@
         </p:nvSpPr>
         <p:spPr>
           <a:xfrm>
-            <a:off x="457200" y="3673623"/>
+            <a:off x="457200" y="4230620"/>
             <a:ext cx="6347048" cy="604664"/>
           </a:xfrm>
           <a:prstGeom prst="rect">

</xml_diff>

<commit_message>
Added image of new version.
</commit_message>
<xml_diff>
--- a/res/HeartRateMonitor.pptx
+++ b/res/HeartRateMonitor.pptx
@@ -5,7 +5,7 @@
     <p:sldMasterId id="2147483648" r:id="rId1"/>
   </p:sldMasterIdLst>
   <p:notesMasterIdLst>
-    <p:notesMasterId r:id="rId33"/>
+    <p:notesMasterId r:id="rId34"/>
   </p:notesMasterIdLst>
   <p:sldIdLst>
     <p:sldId id="256" r:id="rId2"/>
@@ -39,6 +39,7 @@
     <p:sldId id="285" r:id="rId30"/>
     <p:sldId id="286" r:id="rId31"/>
     <p:sldId id="287" r:id="rId32"/>
+    <p:sldId id="288" r:id="rId33"/>
   </p:sldIdLst>
   <p:sldSz cx="9144000" cy="6858000" type="screen4x3"/>
   <p:notesSz cx="6858000" cy="9144000"/>
@@ -222,7 +223,7 @@
           <a:p>
             <a:fld id="{A6ECA08F-F96F-4BD4-A634-E90DA7FFA32E}" type="datetimeFigureOut">
               <a:rPr lang="en-US" smtClean="0"/>
-              <a:t>7/23/2014</a:t>
+              <a:t>8/8/2014</a:t>
             </a:fld>
             <a:endParaRPr lang="en-US"/>
           </a:p>
@@ -3344,7 +3345,7 @@
           <a:p>
             <a:fld id="{1867D673-17F2-4AAF-8773-56A9AD33FE77}" type="datetimeFigureOut">
               <a:rPr lang="de-DE" smtClean="0"/>
-              <a:t>23.07.2014</a:t>
+              <a:t>08.08.2014</a:t>
             </a:fld>
             <a:endParaRPr lang="de-DE"/>
           </a:p>
@@ -3514,7 +3515,7 @@
           <a:p>
             <a:fld id="{1867D673-17F2-4AAF-8773-56A9AD33FE77}" type="datetimeFigureOut">
               <a:rPr lang="de-DE" smtClean="0"/>
-              <a:t>23.07.2014</a:t>
+              <a:t>08.08.2014</a:t>
             </a:fld>
             <a:endParaRPr lang="de-DE"/>
           </a:p>
@@ -3694,7 +3695,7 @@
           <a:p>
             <a:fld id="{1867D673-17F2-4AAF-8773-56A9AD33FE77}" type="datetimeFigureOut">
               <a:rPr lang="de-DE" smtClean="0"/>
-              <a:t>23.07.2014</a:t>
+              <a:t>08.08.2014</a:t>
             </a:fld>
             <a:endParaRPr lang="de-DE"/>
           </a:p>
@@ -3864,7 +3865,7 @@
           <a:p>
             <a:fld id="{1867D673-17F2-4AAF-8773-56A9AD33FE77}" type="datetimeFigureOut">
               <a:rPr lang="de-DE" smtClean="0"/>
-              <a:t>23.07.2014</a:t>
+              <a:t>08.08.2014</a:t>
             </a:fld>
             <a:endParaRPr lang="de-DE"/>
           </a:p>
@@ -4110,7 +4111,7 @@
           <a:p>
             <a:fld id="{1867D673-17F2-4AAF-8773-56A9AD33FE77}" type="datetimeFigureOut">
               <a:rPr lang="de-DE" smtClean="0"/>
-              <a:t>23.07.2014</a:t>
+              <a:t>08.08.2014</a:t>
             </a:fld>
             <a:endParaRPr lang="de-DE"/>
           </a:p>
@@ -4398,7 +4399,7 @@
           <a:p>
             <a:fld id="{1867D673-17F2-4AAF-8773-56A9AD33FE77}" type="datetimeFigureOut">
               <a:rPr lang="de-DE" smtClean="0"/>
-              <a:t>23.07.2014</a:t>
+              <a:t>08.08.2014</a:t>
             </a:fld>
             <a:endParaRPr lang="de-DE"/>
           </a:p>
@@ -4820,7 +4821,7 @@
           <a:p>
             <a:fld id="{1867D673-17F2-4AAF-8773-56A9AD33FE77}" type="datetimeFigureOut">
               <a:rPr lang="de-DE" smtClean="0"/>
-              <a:t>23.07.2014</a:t>
+              <a:t>08.08.2014</a:t>
             </a:fld>
             <a:endParaRPr lang="de-DE"/>
           </a:p>
@@ -4938,7 +4939,7 @@
           <a:p>
             <a:fld id="{1867D673-17F2-4AAF-8773-56A9AD33FE77}" type="datetimeFigureOut">
               <a:rPr lang="de-DE" smtClean="0"/>
-              <a:t>23.07.2014</a:t>
+              <a:t>08.08.2014</a:t>
             </a:fld>
             <a:endParaRPr lang="de-DE"/>
           </a:p>
@@ -5033,7 +5034,7 @@
           <a:p>
             <a:fld id="{1867D673-17F2-4AAF-8773-56A9AD33FE77}" type="datetimeFigureOut">
               <a:rPr lang="de-DE" smtClean="0"/>
-              <a:t>23.07.2014</a:t>
+              <a:t>08.08.2014</a:t>
             </a:fld>
             <a:endParaRPr lang="de-DE"/>
           </a:p>
@@ -5310,7 +5311,7 @@
           <a:p>
             <a:fld id="{1867D673-17F2-4AAF-8773-56A9AD33FE77}" type="datetimeFigureOut">
               <a:rPr lang="de-DE" smtClean="0"/>
-              <a:t>23.07.2014</a:t>
+              <a:t>08.08.2014</a:t>
             </a:fld>
             <a:endParaRPr lang="de-DE"/>
           </a:p>
@@ -5563,7 +5564,7 @@
           <a:p>
             <a:fld id="{1867D673-17F2-4AAF-8773-56A9AD33FE77}" type="datetimeFigureOut">
               <a:rPr lang="de-DE" smtClean="0"/>
-              <a:t>23.07.2014</a:t>
+              <a:t>08.08.2014</a:t>
             </a:fld>
             <a:endParaRPr lang="de-DE"/>
           </a:p>
@@ -5776,7 +5777,7 @@
           <a:p>
             <a:fld id="{1867D673-17F2-4AAF-8773-56A9AD33FE77}" type="datetimeFigureOut">
               <a:rPr lang="de-DE" smtClean="0"/>
-              <a:t>23.07.2014</a:t>
+              <a:t>08.08.2014</a:t>
             </a:fld>
             <a:endParaRPr lang="de-DE"/>
           </a:p>
@@ -18274,6 +18275,615 @@
 </p:sld>
 </file>
 
+<file path=ppt/slides/slide32.xml><?xml version="1.0" encoding="utf-8"?>
+<p:sld xmlns:a="http://schemas.openxmlformats.org/drawingml/2006/main" xmlns:r="http://schemas.openxmlformats.org/officeDocument/2006/relationships" xmlns:p="http://schemas.openxmlformats.org/presentationml/2006/main">
+  <p:cSld>
+    <p:spTree>
+      <p:nvGrpSpPr>
+        <p:cNvPr id="1" name=""/>
+        <p:cNvGrpSpPr/>
+        <p:nvPr/>
+      </p:nvGrpSpPr>
+      <p:grpSpPr>
+        <a:xfrm>
+          <a:off x="0" y="0"/>
+          <a:ext cx="0" cy="0"/>
+          <a:chOff x="0" y="0"/>
+          <a:chExt cx="0" cy="0"/>
+        </a:xfrm>
+      </p:grpSpPr>
+      <p:sp>
+        <p:nvSpPr>
+          <p:cNvPr id="21" name="Rechteck 20"/>
+          <p:cNvSpPr/>
+          <p:nvPr/>
+        </p:nvSpPr>
+        <p:spPr>
+          <a:xfrm>
+            <a:off x="3414954" y="2619288"/>
+            <a:ext cx="1980000" cy="1980000"/>
+          </a:xfrm>
+          <a:prstGeom prst="rect">
+            <a:avLst/>
+          </a:prstGeom>
+          <a:solidFill>
+            <a:schemeClr val="accent5">
+              <a:lumMod val="20000"/>
+              <a:lumOff val="80000"/>
+            </a:schemeClr>
+          </a:solidFill>
+          <a:ln>
+            <a:solidFill>
+              <a:schemeClr val="tx1"/>
+            </a:solidFill>
+          </a:ln>
+        </p:spPr>
+        <p:style>
+          <a:lnRef idx="2">
+            <a:schemeClr val="accent5">
+              <a:shade val="50000"/>
+            </a:schemeClr>
+          </a:lnRef>
+          <a:fillRef idx="1">
+            <a:schemeClr val="accent5"/>
+          </a:fillRef>
+          <a:effectRef idx="0">
+            <a:schemeClr val="accent5"/>
+          </a:effectRef>
+          <a:fontRef idx="minor">
+            <a:schemeClr val="lt1"/>
+          </a:fontRef>
+        </p:style>
+        <p:txBody>
+          <a:bodyPr rtlCol="0" anchor="ctr"/>
+          <a:lstStyle/>
+          <a:p>
+            <a:pPr algn="ctr"/>
+            <a:endParaRPr lang="en-US"/>
+          </a:p>
+        </p:txBody>
+      </p:sp>
+      <p:grpSp>
+        <p:nvGrpSpPr>
+          <p:cNvPr id="20" name="Gruppieren 19"/>
+          <p:cNvGrpSpPr/>
+          <p:nvPr/>
+        </p:nvGrpSpPr>
+        <p:grpSpPr>
+          <a:xfrm>
+            <a:off x="3504954" y="2709288"/>
+            <a:ext cx="1800000" cy="1800000"/>
+            <a:chOff x="3059832" y="2708920"/>
+            <a:chExt cx="2709403" cy="980217"/>
+          </a:xfrm>
+        </p:grpSpPr>
+        <p:grpSp>
+          <p:nvGrpSpPr>
+            <p:cNvPr id="4" name="Gruppieren 3"/>
+            <p:cNvGrpSpPr/>
+            <p:nvPr/>
+          </p:nvGrpSpPr>
+          <p:grpSpPr>
+            <a:xfrm>
+              <a:off x="3059832" y="2708920"/>
+              <a:ext cx="2119875" cy="980217"/>
+              <a:chOff x="6012160" y="5362582"/>
+              <a:chExt cx="2894338" cy="1306778"/>
+            </a:xfrm>
+          </p:grpSpPr>
+          <p:grpSp>
+            <p:nvGrpSpPr>
+              <p:cNvPr id="5" name="Gruppieren 4"/>
+              <p:cNvGrpSpPr/>
+              <p:nvPr/>
+            </p:nvGrpSpPr>
+            <p:grpSpPr>
+              <a:xfrm>
+                <a:off x="6012160" y="5362582"/>
+                <a:ext cx="1584176" cy="1306778"/>
+                <a:chOff x="6012160" y="5362582"/>
+                <a:chExt cx="1584176" cy="1306778"/>
+              </a:xfrm>
+            </p:grpSpPr>
+            <p:cxnSp>
+              <p:nvCxnSpPr>
+                <p:cNvPr id="13" name="Gerade Verbindung 12"/>
+                <p:cNvCxnSpPr/>
+                <p:nvPr/>
+              </p:nvCxnSpPr>
+              <p:spPr>
+                <a:xfrm>
+                  <a:off x="6012160" y="6237312"/>
+                  <a:ext cx="648072" cy="0"/>
+                </a:xfrm>
+                <a:prstGeom prst="line">
+                  <a:avLst/>
+                </a:prstGeom>
+                <a:ln w="38100">
+                  <a:solidFill>
+                    <a:srgbClr val="FF0000"/>
+                  </a:solidFill>
+                </a:ln>
+              </p:spPr>
+              <p:style>
+                <a:lnRef idx="1">
+                  <a:schemeClr val="accent1"/>
+                </a:lnRef>
+                <a:fillRef idx="0">
+                  <a:schemeClr val="accent1"/>
+                </a:fillRef>
+                <a:effectRef idx="0">
+                  <a:schemeClr val="accent1"/>
+                </a:effectRef>
+                <a:fontRef idx="minor">
+                  <a:schemeClr val="tx1"/>
+                </a:fontRef>
+              </p:style>
+            </p:cxnSp>
+            <p:cxnSp>
+              <p:nvCxnSpPr>
+                <p:cNvPr id="14" name="Gerade Verbindung 13"/>
+                <p:cNvCxnSpPr/>
+                <p:nvPr/>
+              </p:nvCxnSpPr>
+              <p:spPr>
+                <a:xfrm flipH="1">
+                  <a:off x="6660232" y="5373216"/>
+                  <a:ext cx="144016" cy="864096"/>
+                </a:xfrm>
+                <a:prstGeom prst="line">
+                  <a:avLst/>
+                </a:prstGeom>
+                <a:ln w="38100">
+                  <a:solidFill>
+                    <a:srgbClr val="FF0000"/>
+                  </a:solidFill>
+                </a:ln>
+              </p:spPr>
+              <p:style>
+                <a:lnRef idx="1">
+                  <a:schemeClr val="accent1"/>
+                </a:lnRef>
+                <a:fillRef idx="0">
+                  <a:schemeClr val="accent1"/>
+                </a:fillRef>
+                <a:effectRef idx="0">
+                  <a:schemeClr val="accent1"/>
+                </a:effectRef>
+                <a:fontRef idx="minor">
+                  <a:schemeClr val="tx1"/>
+                </a:fontRef>
+              </p:style>
+            </p:cxnSp>
+            <p:cxnSp>
+              <p:nvCxnSpPr>
+                <p:cNvPr id="15" name="Gerade Verbindung 14"/>
+                <p:cNvCxnSpPr/>
+                <p:nvPr/>
+              </p:nvCxnSpPr>
+              <p:spPr>
+                <a:xfrm flipH="1" flipV="1">
+                  <a:off x="6821873" y="5362582"/>
+                  <a:ext cx="144016" cy="1306778"/>
+                </a:xfrm>
+                <a:prstGeom prst="line">
+                  <a:avLst/>
+                </a:prstGeom>
+                <a:ln w="38100">
+                  <a:solidFill>
+                    <a:srgbClr val="FF0000"/>
+                  </a:solidFill>
+                </a:ln>
+              </p:spPr>
+              <p:style>
+                <a:lnRef idx="1">
+                  <a:schemeClr val="accent1"/>
+                </a:lnRef>
+                <a:fillRef idx="0">
+                  <a:schemeClr val="accent1"/>
+                </a:fillRef>
+                <a:effectRef idx="0">
+                  <a:schemeClr val="accent1"/>
+                </a:effectRef>
+                <a:fontRef idx="minor">
+                  <a:schemeClr val="tx1"/>
+                </a:fontRef>
+              </p:style>
+            </p:cxnSp>
+            <p:cxnSp>
+              <p:nvCxnSpPr>
+                <p:cNvPr id="16" name="Gerade Verbindung 15"/>
+                <p:cNvCxnSpPr/>
+                <p:nvPr/>
+              </p:nvCxnSpPr>
+              <p:spPr>
+                <a:xfrm flipH="1">
+                  <a:off x="6965890" y="6016239"/>
+                  <a:ext cx="152757" cy="653121"/>
+                </a:xfrm>
+                <a:prstGeom prst="line">
+                  <a:avLst/>
+                </a:prstGeom>
+                <a:ln w="38100">
+                  <a:solidFill>
+                    <a:srgbClr val="FF0000"/>
+                  </a:solidFill>
+                </a:ln>
+              </p:spPr>
+              <p:style>
+                <a:lnRef idx="1">
+                  <a:schemeClr val="accent1"/>
+                </a:lnRef>
+                <a:fillRef idx="0">
+                  <a:schemeClr val="accent1"/>
+                </a:fillRef>
+                <a:effectRef idx="0">
+                  <a:schemeClr val="accent1"/>
+                </a:effectRef>
+                <a:fontRef idx="minor">
+                  <a:schemeClr val="tx1"/>
+                </a:fontRef>
+              </p:style>
+            </p:cxnSp>
+            <p:cxnSp>
+              <p:nvCxnSpPr>
+                <p:cNvPr id="17" name="Gerade Verbindung 16"/>
+                <p:cNvCxnSpPr/>
+                <p:nvPr/>
+              </p:nvCxnSpPr>
+              <p:spPr>
+                <a:xfrm flipH="1" flipV="1">
+                  <a:off x="7118648" y="6016240"/>
+                  <a:ext cx="102548" cy="205098"/>
+                </a:xfrm>
+                <a:prstGeom prst="line">
+                  <a:avLst/>
+                </a:prstGeom>
+                <a:ln w="38100">
+                  <a:solidFill>
+                    <a:srgbClr val="FF0000"/>
+                  </a:solidFill>
+                </a:ln>
+              </p:spPr>
+              <p:style>
+                <a:lnRef idx="1">
+                  <a:schemeClr val="accent1"/>
+                </a:lnRef>
+                <a:fillRef idx="0">
+                  <a:schemeClr val="accent1"/>
+                </a:fillRef>
+                <a:effectRef idx="0">
+                  <a:schemeClr val="accent1"/>
+                </a:effectRef>
+                <a:fontRef idx="minor">
+                  <a:schemeClr val="tx1"/>
+                </a:fontRef>
+              </p:style>
+            </p:cxnSp>
+            <p:cxnSp>
+              <p:nvCxnSpPr>
+                <p:cNvPr id="18" name="Gerade Verbindung 17"/>
+                <p:cNvCxnSpPr/>
+                <p:nvPr/>
+              </p:nvCxnSpPr>
+              <p:spPr>
+                <a:xfrm flipH="1">
+                  <a:off x="7221196" y="6237312"/>
+                  <a:ext cx="375140" cy="0"/>
+                </a:xfrm>
+                <a:prstGeom prst="line">
+                  <a:avLst/>
+                </a:prstGeom>
+                <a:ln w="38100">
+                  <a:solidFill>
+                    <a:srgbClr val="FF0000"/>
+                  </a:solidFill>
+                </a:ln>
+              </p:spPr>
+              <p:style>
+                <a:lnRef idx="1">
+                  <a:schemeClr val="accent1"/>
+                </a:lnRef>
+                <a:fillRef idx="0">
+                  <a:schemeClr val="accent1"/>
+                </a:fillRef>
+                <a:effectRef idx="0">
+                  <a:schemeClr val="accent1"/>
+                </a:effectRef>
+                <a:fontRef idx="minor">
+                  <a:schemeClr val="tx1"/>
+                </a:fontRef>
+              </p:style>
+            </p:cxnSp>
+          </p:grpSp>
+          <p:grpSp>
+            <p:nvGrpSpPr>
+              <p:cNvPr id="6" name="Gruppieren 5"/>
+              <p:cNvGrpSpPr/>
+              <p:nvPr/>
+            </p:nvGrpSpPr>
+            <p:grpSpPr>
+              <a:xfrm>
+                <a:off x="7322322" y="5362582"/>
+                <a:ext cx="1584176" cy="1306778"/>
+                <a:chOff x="6012160" y="5362582"/>
+                <a:chExt cx="1584176" cy="1306778"/>
+              </a:xfrm>
+            </p:grpSpPr>
+            <p:cxnSp>
+              <p:nvCxnSpPr>
+                <p:cNvPr id="7" name="Gerade Verbindung 6"/>
+                <p:cNvCxnSpPr/>
+                <p:nvPr/>
+              </p:nvCxnSpPr>
+              <p:spPr>
+                <a:xfrm>
+                  <a:off x="6012160" y="6237312"/>
+                  <a:ext cx="648072" cy="0"/>
+                </a:xfrm>
+                <a:prstGeom prst="line">
+                  <a:avLst/>
+                </a:prstGeom>
+                <a:ln w="38100">
+                  <a:solidFill>
+                    <a:srgbClr val="FF0000"/>
+                  </a:solidFill>
+                </a:ln>
+              </p:spPr>
+              <p:style>
+                <a:lnRef idx="1">
+                  <a:schemeClr val="accent1"/>
+                </a:lnRef>
+                <a:fillRef idx="0">
+                  <a:schemeClr val="accent1"/>
+                </a:fillRef>
+                <a:effectRef idx="0">
+                  <a:schemeClr val="accent1"/>
+                </a:effectRef>
+                <a:fontRef idx="minor">
+                  <a:schemeClr val="tx1"/>
+                </a:fontRef>
+              </p:style>
+            </p:cxnSp>
+            <p:cxnSp>
+              <p:nvCxnSpPr>
+                <p:cNvPr id="8" name="Gerade Verbindung 7"/>
+                <p:cNvCxnSpPr/>
+                <p:nvPr/>
+              </p:nvCxnSpPr>
+              <p:spPr>
+                <a:xfrm flipH="1">
+                  <a:off x="6660232" y="5373216"/>
+                  <a:ext cx="144016" cy="864096"/>
+                </a:xfrm>
+                <a:prstGeom prst="line">
+                  <a:avLst/>
+                </a:prstGeom>
+                <a:ln w="38100">
+                  <a:solidFill>
+                    <a:srgbClr val="FF0000"/>
+                  </a:solidFill>
+                </a:ln>
+              </p:spPr>
+              <p:style>
+                <a:lnRef idx="1">
+                  <a:schemeClr val="accent1"/>
+                </a:lnRef>
+                <a:fillRef idx="0">
+                  <a:schemeClr val="accent1"/>
+                </a:fillRef>
+                <a:effectRef idx="0">
+                  <a:schemeClr val="accent1"/>
+                </a:effectRef>
+                <a:fontRef idx="minor">
+                  <a:schemeClr val="tx1"/>
+                </a:fontRef>
+              </p:style>
+            </p:cxnSp>
+            <p:cxnSp>
+              <p:nvCxnSpPr>
+                <p:cNvPr id="9" name="Gerade Verbindung 8"/>
+                <p:cNvCxnSpPr/>
+                <p:nvPr/>
+              </p:nvCxnSpPr>
+              <p:spPr>
+                <a:xfrm flipH="1" flipV="1">
+                  <a:off x="6821873" y="5362582"/>
+                  <a:ext cx="144016" cy="1306778"/>
+                </a:xfrm>
+                <a:prstGeom prst="line">
+                  <a:avLst/>
+                </a:prstGeom>
+                <a:ln w="38100">
+                  <a:solidFill>
+                    <a:srgbClr val="FF0000"/>
+                  </a:solidFill>
+                </a:ln>
+              </p:spPr>
+              <p:style>
+                <a:lnRef idx="1">
+                  <a:schemeClr val="accent1"/>
+                </a:lnRef>
+                <a:fillRef idx="0">
+                  <a:schemeClr val="accent1"/>
+                </a:fillRef>
+                <a:effectRef idx="0">
+                  <a:schemeClr val="accent1"/>
+                </a:effectRef>
+                <a:fontRef idx="minor">
+                  <a:schemeClr val="tx1"/>
+                </a:fontRef>
+              </p:style>
+            </p:cxnSp>
+            <p:cxnSp>
+              <p:nvCxnSpPr>
+                <p:cNvPr id="10" name="Gerade Verbindung 9"/>
+                <p:cNvCxnSpPr/>
+                <p:nvPr/>
+              </p:nvCxnSpPr>
+              <p:spPr>
+                <a:xfrm flipH="1">
+                  <a:off x="6965890" y="6016239"/>
+                  <a:ext cx="152757" cy="653121"/>
+                </a:xfrm>
+                <a:prstGeom prst="line">
+                  <a:avLst/>
+                </a:prstGeom>
+                <a:ln w="38100">
+                  <a:solidFill>
+                    <a:srgbClr val="FF0000"/>
+                  </a:solidFill>
+                </a:ln>
+              </p:spPr>
+              <p:style>
+                <a:lnRef idx="1">
+                  <a:schemeClr val="accent1"/>
+                </a:lnRef>
+                <a:fillRef idx="0">
+                  <a:schemeClr val="accent1"/>
+                </a:fillRef>
+                <a:effectRef idx="0">
+                  <a:schemeClr val="accent1"/>
+                </a:effectRef>
+                <a:fontRef idx="minor">
+                  <a:schemeClr val="tx1"/>
+                </a:fontRef>
+              </p:style>
+            </p:cxnSp>
+            <p:cxnSp>
+              <p:nvCxnSpPr>
+                <p:cNvPr id="11" name="Gerade Verbindung 10"/>
+                <p:cNvCxnSpPr/>
+                <p:nvPr/>
+              </p:nvCxnSpPr>
+              <p:spPr>
+                <a:xfrm flipH="1" flipV="1">
+                  <a:off x="7118648" y="6016240"/>
+                  <a:ext cx="102548" cy="205098"/>
+                </a:xfrm>
+                <a:prstGeom prst="line">
+                  <a:avLst/>
+                </a:prstGeom>
+                <a:ln w="38100">
+                  <a:solidFill>
+                    <a:srgbClr val="FF0000"/>
+                  </a:solidFill>
+                </a:ln>
+              </p:spPr>
+              <p:style>
+                <a:lnRef idx="1">
+                  <a:schemeClr val="accent1"/>
+                </a:lnRef>
+                <a:fillRef idx="0">
+                  <a:schemeClr val="accent1"/>
+                </a:fillRef>
+                <a:effectRef idx="0">
+                  <a:schemeClr val="accent1"/>
+                </a:effectRef>
+                <a:fontRef idx="minor">
+                  <a:schemeClr val="tx1"/>
+                </a:fontRef>
+              </p:style>
+            </p:cxnSp>
+            <p:cxnSp>
+              <p:nvCxnSpPr>
+                <p:cNvPr id="12" name="Gerade Verbindung 11"/>
+                <p:cNvCxnSpPr/>
+                <p:nvPr/>
+              </p:nvCxnSpPr>
+              <p:spPr>
+                <a:xfrm flipH="1">
+                  <a:off x="7221196" y="6237312"/>
+                  <a:ext cx="375140" cy="0"/>
+                </a:xfrm>
+                <a:prstGeom prst="line">
+                  <a:avLst/>
+                </a:prstGeom>
+                <a:ln w="38100">
+                  <a:solidFill>
+                    <a:srgbClr val="FF0000"/>
+                  </a:solidFill>
+                </a:ln>
+              </p:spPr>
+              <p:style>
+                <a:lnRef idx="1">
+                  <a:schemeClr val="accent1"/>
+                </a:lnRef>
+                <a:fillRef idx="0">
+                  <a:schemeClr val="accent1"/>
+                </a:fillRef>
+                <a:effectRef idx="0">
+                  <a:schemeClr val="accent1"/>
+                </a:effectRef>
+                <a:fontRef idx="minor">
+                  <a:schemeClr val="tx1"/>
+                </a:fontRef>
+              </p:style>
+            </p:cxnSp>
+          </p:grpSp>
+        </p:grpSp>
+        <p:sp>
+          <p:nvSpPr>
+            <p:cNvPr id="19" name="Herz 18"/>
+            <p:cNvSpPr/>
+            <p:nvPr/>
+          </p:nvSpPr>
+          <p:spPr>
+            <a:xfrm>
+              <a:off x="4965821" y="2799436"/>
+              <a:ext cx="803414" cy="350288"/>
+            </a:xfrm>
+            <a:prstGeom prst="heart">
+              <a:avLst/>
+            </a:prstGeom>
+            <a:solidFill>
+              <a:srgbClr val="FF0000"/>
+            </a:solidFill>
+            <a:ln>
+              <a:solidFill>
+                <a:schemeClr val="tx1"/>
+              </a:solidFill>
+            </a:ln>
+          </p:spPr>
+          <p:style>
+            <a:lnRef idx="2">
+              <a:schemeClr val="accent2">
+                <a:shade val="50000"/>
+              </a:schemeClr>
+            </a:lnRef>
+            <a:fillRef idx="1">
+              <a:schemeClr val="accent2"/>
+            </a:fillRef>
+            <a:effectRef idx="0">
+              <a:schemeClr val="accent2"/>
+            </a:effectRef>
+            <a:fontRef idx="minor">
+              <a:schemeClr val="lt1"/>
+            </a:fontRef>
+          </p:style>
+          <p:txBody>
+            <a:bodyPr rtlCol="0" anchor="ctr"/>
+            <a:lstStyle/>
+            <a:p>
+              <a:pPr algn="ctr"/>
+              <a:endParaRPr lang="en-US"/>
+            </a:p>
+          </p:txBody>
+        </p:sp>
+      </p:grpSp>
+    </p:spTree>
+    <p:extLst>
+      <p:ext uri="{BB962C8B-B14F-4D97-AF65-F5344CB8AC3E}">
+        <p14:creationId xmlns:p14="http://schemas.microsoft.com/office/powerpoint/2010/main" val="162627250"/>
+      </p:ext>
+    </p:extLst>
+  </p:cSld>
+  <p:clrMapOvr>
+    <a:masterClrMapping/>
+  </p:clrMapOvr>
+</p:sld>
+</file>
+
 <file path=ppt/slides/slide4.xml><?xml version="1.0" encoding="utf-8"?>
 <p:sld xmlns:a="http://schemas.openxmlformats.org/drawingml/2006/main" xmlns:r="http://schemas.openxmlformats.org/officeDocument/2006/relationships" xmlns:p="http://schemas.openxmlformats.org/presentationml/2006/main">
   <p:cSld>

</xml_diff>

<commit_message>
Just changed a picture.
</commit_message>
<xml_diff>
--- a/res/HeartRateMonitor.pptx
+++ b/res/HeartRateMonitor.pptx
@@ -5,7 +5,7 @@
     <p:sldMasterId id="2147483648" r:id="rId1"/>
   </p:sldMasterIdLst>
   <p:notesMasterIdLst>
-    <p:notesMasterId r:id="rId34"/>
+    <p:notesMasterId r:id="rId36"/>
   </p:notesMasterIdLst>
   <p:sldIdLst>
     <p:sldId id="256" r:id="rId2"/>
@@ -40,6 +40,8 @@
     <p:sldId id="286" r:id="rId31"/>
     <p:sldId id="287" r:id="rId32"/>
     <p:sldId id="288" r:id="rId33"/>
+    <p:sldId id="289" r:id="rId34"/>
+    <p:sldId id="290" r:id="rId35"/>
   </p:sldIdLst>
   <p:sldSz cx="9144000" cy="6858000" type="screen4x3"/>
   <p:notesSz cx="6858000" cy="9144000"/>
@@ -223,7 +225,7 @@
           <a:p>
             <a:fld id="{A6ECA08F-F96F-4BD4-A634-E90DA7FFA32E}" type="datetimeFigureOut">
               <a:rPr lang="en-US" smtClean="0"/>
-              <a:t>8/8/2014</a:t>
+              <a:t>6/1/2015</a:t>
             </a:fld>
             <a:endParaRPr lang="en-US"/>
           </a:p>
@@ -3345,7 +3347,7 @@
           <a:p>
             <a:fld id="{1867D673-17F2-4AAF-8773-56A9AD33FE77}" type="datetimeFigureOut">
               <a:rPr lang="de-DE" smtClean="0"/>
-              <a:t>08.08.2014</a:t>
+              <a:t>01.06.2015</a:t>
             </a:fld>
             <a:endParaRPr lang="de-DE"/>
           </a:p>
@@ -3515,7 +3517,7 @@
           <a:p>
             <a:fld id="{1867D673-17F2-4AAF-8773-56A9AD33FE77}" type="datetimeFigureOut">
               <a:rPr lang="de-DE" smtClean="0"/>
-              <a:t>08.08.2014</a:t>
+              <a:t>01.06.2015</a:t>
             </a:fld>
             <a:endParaRPr lang="de-DE"/>
           </a:p>
@@ -3695,7 +3697,7 @@
           <a:p>
             <a:fld id="{1867D673-17F2-4AAF-8773-56A9AD33FE77}" type="datetimeFigureOut">
               <a:rPr lang="de-DE" smtClean="0"/>
-              <a:t>08.08.2014</a:t>
+              <a:t>01.06.2015</a:t>
             </a:fld>
             <a:endParaRPr lang="de-DE"/>
           </a:p>
@@ -3865,7 +3867,7 @@
           <a:p>
             <a:fld id="{1867D673-17F2-4AAF-8773-56A9AD33FE77}" type="datetimeFigureOut">
               <a:rPr lang="de-DE" smtClean="0"/>
-              <a:t>08.08.2014</a:t>
+              <a:t>01.06.2015</a:t>
             </a:fld>
             <a:endParaRPr lang="de-DE"/>
           </a:p>
@@ -4111,7 +4113,7 @@
           <a:p>
             <a:fld id="{1867D673-17F2-4AAF-8773-56A9AD33FE77}" type="datetimeFigureOut">
               <a:rPr lang="de-DE" smtClean="0"/>
-              <a:t>08.08.2014</a:t>
+              <a:t>01.06.2015</a:t>
             </a:fld>
             <a:endParaRPr lang="de-DE"/>
           </a:p>
@@ -4399,7 +4401,7 @@
           <a:p>
             <a:fld id="{1867D673-17F2-4AAF-8773-56A9AD33FE77}" type="datetimeFigureOut">
               <a:rPr lang="de-DE" smtClean="0"/>
-              <a:t>08.08.2014</a:t>
+              <a:t>01.06.2015</a:t>
             </a:fld>
             <a:endParaRPr lang="de-DE"/>
           </a:p>
@@ -4821,7 +4823,7 @@
           <a:p>
             <a:fld id="{1867D673-17F2-4AAF-8773-56A9AD33FE77}" type="datetimeFigureOut">
               <a:rPr lang="de-DE" smtClean="0"/>
-              <a:t>08.08.2014</a:t>
+              <a:t>01.06.2015</a:t>
             </a:fld>
             <a:endParaRPr lang="de-DE"/>
           </a:p>
@@ -4939,7 +4941,7 @@
           <a:p>
             <a:fld id="{1867D673-17F2-4AAF-8773-56A9AD33FE77}" type="datetimeFigureOut">
               <a:rPr lang="de-DE" smtClean="0"/>
-              <a:t>08.08.2014</a:t>
+              <a:t>01.06.2015</a:t>
             </a:fld>
             <a:endParaRPr lang="de-DE"/>
           </a:p>
@@ -5034,7 +5036,7 @@
           <a:p>
             <a:fld id="{1867D673-17F2-4AAF-8773-56A9AD33FE77}" type="datetimeFigureOut">
               <a:rPr lang="de-DE" smtClean="0"/>
-              <a:t>08.08.2014</a:t>
+              <a:t>01.06.2015</a:t>
             </a:fld>
             <a:endParaRPr lang="de-DE"/>
           </a:p>
@@ -5311,7 +5313,7 @@
           <a:p>
             <a:fld id="{1867D673-17F2-4AAF-8773-56A9AD33FE77}" type="datetimeFigureOut">
               <a:rPr lang="de-DE" smtClean="0"/>
-              <a:t>08.08.2014</a:t>
+              <a:t>01.06.2015</a:t>
             </a:fld>
             <a:endParaRPr lang="de-DE"/>
           </a:p>
@@ -5564,7 +5566,7 @@
           <a:p>
             <a:fld id="{1867D673-17F2-4AAF-8773-56A9AD33FE77}" type="datetimeFigureOut">
               <a:rPr lang="de-DE" smtClean="0"/>
-              <a:t>08.08.2014</a:t>
+              <a:t>01.06.2015</a:t>
             </a:fld>
             <a:endParaRPr lang="de-DE"/>
           </a:p>
@@ -5777,7 +5779,7 @@
           <a:p>
             <a:fld id="{1867D673-17F2-4AAF-8773-56A9AD33FE77}" type="datetimeFigureOut">
               <a:rPr lang="de-DE" smtClean="0"/>
-              <a:t>08.08.2014</a:t>
+              <a:t>01.06.2015</a:t>
             </a:fld>
             <a:endParaRPr lang="de-DE"/>
           </a:p>
@@ -17212,9 +17214,9 @@
         <p:grpSpPr>
           <a:xfrm>
             <a:off x="2067220" y="1495817"/>
-            <a:ext cx="5009561" cy="3866366"/>
+            <a:ext cx="4974743" cy="3866366"/>
             <a:chOff x="1843002" y="1482904"/>
-            <a:chExt cx="5009561" cy="3866366"/>
+            <a:chExt cx="4974743" cy="3866366"/>
           </a:xfrm>
         </p:grpSpPr>
         <p:grpSp>
@@ -17824,108 +17826,312 @@
             </a:p>
           </p:txBody>
         </p:sp>
-        <p:sp>
-          <p:nvSpPr>
-            <p:cNvPr id="50" name="Textfeld 49"/>
-            <p:cNvSpPr txBox="1"/>
-            <p:nvPr/>
-          </p:nvSpPr>
-          <p:spPr>
-            <a:xfrm>
-              <a:off x="6358517" y="2256988"/>
-              <a:ext cx="494046" cy="369332"/>
-            </a:xfrm>
-            <a:prstGeom prst="rect">
-              <a:avLst/>
-            </a:prstGeom>
-            <a:noFill/>
-          </p:spPr>
-          <p:txBody>
-            <a:bodyPr wrap="none" rtlCol="0">
-              <a:spAutoFit/>
-            </a:bodyPr>
-            <a:lstStyle/>
-            <a:p>
-              <a:r>
-                <a:rPr lang="de-DE" dirty="0"/>
-                <a:t>t</a:t>
-              </a:r>
-              <a:r>
-                <a:rPr lang="de-DE" dirty="0" smtClean="0"/>
-                <a:t>_1</a:t>
-              </a:r>
-              <a:endParaRPr lang="en-US" dirty="0"/>
-            </a:p>
-          </p:txBody>
-        </p:sp>
-        <p:sp>
-          <p:nvSpPr>
-            <p:cNvPr id="51" name="Textfeld 50"/>
-            <p:cNvSpPr txBox="1"/>
-            <p:nvPr/>
-          </p:nvSpPr>
-          <p:spPr>
-            <a:xfrm>
-              <a:off x="6343116" y="3156984"/>
-              <a:ext cx="494046" cy="369332"/>
-            </a:xfrm>
-            <a:prstGeom prst="rect">
-              <a:avLst/>
-            </a:prstGeom>
-            <a:noFill/>
-          </p:spPr>
-          <p:txBody>
-            <a:bodyPr wrap="none" rtlCol="0">
-              <a:spAutoFit/>
-            </a:bodyPr>
-            <a:lstStyle/>
-            <a:p>
-              <a:r>
-                <a:rPr lang="de-DE" dirty="0"/>
-                <a:t>t</a:t>
-              </a:r>
-              <a:r>
-                <a:rPr lang="de-DE" dirty="0" smtClean="0"/>
-                <a:t>_2</a:t>
-              </a:r>
-              <a:endParaRPr lang="en-US" dirty="0"/>
-            </a:p>
-          </p:txBody>
-        </p:sp>
-        <p:sp>
-          <p:nvSpPr>
-            <p:cNvPr id="52" name="Textfeld 51"/>
-            <p:cNvSpPr txBox="1"/>
-            <p:nvPr/>
-          </p:nvSpPr>
-          <p:spPr>
-            <a:xfrm>
-              <a:off x="6358517" y="4029482"/>
-              <a:ext cx="494046" cy="369332"/>
-            </a:xfrm>
-            <a:prstGeom prst="rect">
-              <a:avLst/>
-            </a:prstGeom>
-            <a:noFill/>
-          </p:spPr>
-          <p:txBody>
-            <a:bodyPr wrap="none" rtlCol="0">
-              <a:spAutoFit/>
-            </a:bodyPr>
-            <a:lstStyle/>
-            <a:p>
-              <a:r>
-                <a:rPr lang="de-DE" dirty="0"/>
-                <a:t>t</a:t>
-              </a:r>
-              <a:r>
-                <a:rPr lang="de-DE" dirty="0" smtClean="0"/>
-                <a:t>_3</a:t>
-              </a:r>
-              <a:endParaRPr lang="en-US" dirty="0"/>
-            </a:p>
-          </p:txBody>
-        </p:sp>
+        <mc:AlternateContent xmlns:mc="http://schemas.openxmlformats.org/markup-compatibility/2006">
+          <mc:Choice xmlns:a14="http://schemas.microsoft.com/office/drawing/2010/main" Requires="a14">
+            <p:sp>
+              <p:nvSpPr>
+                <p:cNvPr id="50" name="Textfeld 49"/>
+                <p:cNvSpPr txBox="1"/>
+                <p:nvPr/>
+              </p:nvSpPr>
+              <p:spPr>
+                <a:xfrm>
+                  <a:off x="6358517" y="2273763"/>
+                  <a:ext cx="453265" cy="400110"/>
+                </a:xfrm>
+                <a:prstGeom prst="rect">
+                  <a:avLst/>
+                </a:prstGeom>
+                <a:noFill/>
+              </p:spPr>
+              <p:txBody>
+                <a:bodyPr wrap="none" rtlCol="0">
+                  <a:spAutoFit/>
+                </a:bodyPr>
+                <a:lstStyle/>
+                <a:p>
+                  <a14:m>
+                    <m:oMathPara xmlns:m="http://schemas.openxmlformats.org/officeDocument/2006/math">
+                      <m:oMathParaPr>
+                        <m:jc m:val="centerGroup"/>
+                      </m:oMathParaPr>
+                      <m:oMath xmlns:m="http://schemas.openxmlformats.org/officeDocument/2006/math">
+                        <m:sSub>
+                          <m:sSubPr>
+                            <m:ctrlPr>
+                              <a:rPr lang="de-DE" sz="2000" b="0" i="1" smtClean="0">
+                                <a:latin typeface="Cambria Math"/>
+                              </a:rPr>
+                            </m:ctrlPr>
+                          </m:sSubPr>
+                          <m:e>
+                            <m:r>
+                              <a:rPr lang="de-DE" sz="2000" b="0" i="1" smtClean="0">
+                                <a:latin typeface="Cambria Math"/>
+                              </a:rPr>
+                              <m:t>𝑡</m:t>
+                            </m:r>
+                          </m:e>
+                          <m:sub>
+                            <m:r>
+                              <a:rPr lang="de-DE" sz="2000" b="0" i="1" smtClean="0">
+                                <a:latin typeface="Cambria Math"/>
+                              </a:rPr>
+                              <m:t>1</m:t>
+                            </m:r>
+                          </m:sub>
+                        </m:sSub>
+                      </m:oMath>
+                    </m:oMathPara>
+                  </a14:m>
+                  <a:endParaRPr lang="en-US" sz="2000" dirty="0"/>
+                </a:p>
+              </p:txBody>
+            </p:sp>
+          </mc:Choice>
+          <mc:Fallback>
+            <p:sp>
+              <p:nvSpPr>
+                <p:cNvPr id="50" name="Textfeld 49"/>
+                <p:cNvSpPr txBox="1">
+                  <a:spLocks noRot="1" noChangeAspect="1" noMove="1" noResize="1" noEditPoints="1" noAdjustHandles="1" noChangeArrowheads="1" noChangeShapeType="1" noTextEdit="1"/>
+                </p:cNvSpPr>
+                <p:nvPr/>
+              </p:nvSpPr>
+              <p:spPr>
+                <a:xfrm>
+                  <a:off x="6358517" y="2273763"/>
+                  <a:ext cx="453265" cy="400110"/>
+                </a:xfrm>
+                <a:prstGeom prst="rect">
+                  <a:avLst/>
+                </a:prstGeom>
+                <a:blipFill rotWithShape="1">
+                  <a:blip r:embed="rId2"/>
+                  <a:stretch>
+                    <a:fillRect/>
+                  </a:stretch>
+                </a:blipFill>
+              </p:spPr>
+              <p:txBody>
+                <a:bodyPr/>
+                <a:lstStyle/>
+                <a:p>
+                  <a:r>
+                    <a:rPr lang="en-US">
+                      <a:noFill/>
+                    </a:rPr>
+                    <a:t> </a:t>
+                  </a:r>
+                </a:p>
+              </p:txBody>
+            </p:sp>
+          </mc:Fallback>
+        </mc:AlternateContent>
+        <mc:AlternateContent xmlns:mc="http://schemas.openxmlformats.org/markup-compatibility/2006">
+          <mc:Choice xmlns:a14="http://schemas.microsoft.com/office/drawing/2010/main" Requires="a14">
+            <p:sp>
+              <p:nvSpPr>
+                <p:cNvPr id="51" name="Textfeld 50"/>
+                <p:cNvSpPr txBox="1"/>
+                <p:nvPr/>
+              </p:nvSpPr>
+              <p:spPr>
+                <a:xfrm>
+                  <a:off x="6358517" y="3146261"/>
+                  <a:ext cx="459228" cy="400110"/>
+                </a:xfrm>
+                <a:prstGeom prst="rect">
+                  <a:avLst/>
+                </a:prstGeom>
+                <a:noFill/>
+              </p:spPr>
+              <p:txBody>
+                <a:bodyPr wrap="none" rtlCol="0">
+                  <a:spAutoFit/>
+                </a:bodyPr>
+                <a:lstStyle/>
+                <a:p>
+                  <a14:m>
+                    <m:oMathPara xmlns:m="http://schemas.openxmlformats.org/officeDocument/2006/math">
+                      <m:oMathParaPr>
+                        <m:jc m:val="centerGroup"/>
+                      </m:oMathParaPr>
+                      <m:oMath xmlns:m="http://schemas.openxmlformats.org/officeDocument/2006/math">
+                        <m:sSub>
+                          <m:sSubPr>
+                            <m:ctrlPr>
+                              <a:rPr lang="en-US" sz="2000" i="1" smtClean="0">
+                                <a:latin typeface="Cambria Math"/>
+                              </a:rPr>
+                            </m:ctrlPr>
+                          </m:sSubPr>
+                          <m:e>
+                            <m:r>
+                              <a:rPr lang="de-DE" sz="2000" b="0" i="1" smtClean="0">
+                                <a:latin typeface="Cambria Math"/>
+                              </a:rPr>
+                              <m:t>𝑡</m:t>
+                            </m:r>
+                          </m:e>
+                          <m:sub>
+                            <m:r>
+                              <a:rPr lang="de-DE" sz="2000" b="0" i="1" smtClean="0">
+                                <a:latin typeface="Cambria Math"/>
+                              </a:rPr>
+                              <m:t>2</m:t>
+                            </m:r>
+                          </m:sub>
+                        </m:sSub>
+                      </m:oMath>
+                    </m:oMathPara>
+                  </a14:m>
+                  <a:endParaRPr lang="en-US" sz="2000" dirty="0"/>
+                </a:p>
+              </p:txBody>
+            </p:sp>
+          </mc:Choice>
+          <mc:Fallback>
+            <p:sp>
+              <p:nvSpPr>
+                <p:cNvPr id="51" name="Textfeld 50"/>
+                <p:cNvSpPr txBox="1">
+                  <a:spLocks noRot="1" noChangeAspect="1" noMove="1" noResize="1" noEditPoints="1" noAdjustHandles="1" noChangeArrowheads="1" noChangeShapeType="1" noTextEdit="1"/>
+                </p:cNvSpPr>
+                <p:nvPr/>
+              </p:nvSpPr>
+              <p:spPr>
+                <a:xfrm>
+                  <a:off x="6358517" y="3146261"/>
+                  <a:ext cx="459228" cy="400110"/>
+                </a:xfrm>
+                <a:prstGeom prst="rect">
+                  <a:avLst/>
+                </a:prstGeom>
+                <a:blipFill rotWithShape="1">
+                  <a:blip r:embed="rId3"/>
+                  <a:stretch>
+                    <a:fillRect/>
+                  </a:stretch>
+                </a:blipFill>
+              </p:spPr>
+              <p:txBody>
+                <a:bodyPr/>
+                <a:lstStyle/>
+                <a:p>
+                  <a:r>
+                    <a:rPr lang="en-US">
+                      <a:noFill/>
+                    </a:rPr>
+                    <a:t> </a:t>
+                  </a:r>
+                </a:p>
+              </p:txBody>
+            </p:sp>
+          </mc:Fallback>
+        </mc:AlternateContent>
+        <mc:AlternateContent xmlns:mc="http://schemas.openxmlformats.org/markup-compatibility/2006">
+          <mc:Choice xmlns:a14="http://schemas.microsoft.com/office/drawing/2010/main" Requires="a14">
+            <p:sp>
+              <p:nvSpPr>
+                <p:cNvPr id="52" name="Textfeld 51"/>
+                <p:cNvSpPr txBox="1"/>
+                <p:nvPr/>
+              </p:nvSpPr>
+              <p:spPr>
+                <a:xfrm>
+                  <a:off x="6358517" y="4018759"/>
+                  <a:ext cx="459228" cy="400110"/>
+                </a:xfrm>
+                <a:prstGeom prst="rect">
+                  <a:avLst/>
+                </a:prstGeom>
+                <a:noFill/>
+              </p:spPr>
+              <p:txBody>
+                <a:bodyPr wrap="none" rtlCol="0">
+                  <a:spAutoFit/>
+                </a:bodyPr>
+                <a:lstStyle/>
+                <a:p>
+                  <a14:m>
+                    <m:oMathPara xmlns:m="http://schemas.openxmlformats.org/officeDocument/2006/math">
+                      <m:oMathParaPr>
+                        <m:jc m:val="centerGroup"/>
+                      </m:oMathParaPr>
+                      <m:oMath xmlns:m="http://schemas.openxmlformats.org/officeDocument/2006/math">
+                        <m:sSub>
+                          <m:sSubPr>
+                            <m:ctrlPr>
+                              <a:rPr lang="en-US" sz="2000" i="1" smtClean="0">
+                                <a:latin typeface="Cambria Math"/>
+                              </a:rPr>
+                            </m:ctrlPr>
+                          </m:sSubPr>
+                          <m:e>
+                            <m:r>
+                              <a:rPr lang="de-DE" sz="2000" b="0" i="1" smtClean="0">
+                                <a:latin typeface="Cambria Math"/>
+                              </a:rPr>
+                              <m:t>𝑡</m:t>
+                            </m:r>
+                          </m:e>
+                          <m:sub>
+                            <m:r>
+                              <a:rPr lang="de-DE" sz="2000" b="0" i="1" smtClean="0">
+                                <a:latin typeface="Cambria Math"/>
+                              </a:rPr>
+                              <m:t>3</m:t>
+                            </m:r>
+                          </m:sub>
+                        </m:sSub>
+                      </m:oMath>
+                    </m:oMathPara>
+                  </a14:m>
+                  <a:endParaRPr lang="en-US" sz="2000" dirty="0"/>
+                </a:p>
+              </p:txBody>
+            </p:sp>
+          </mc:Choice>
+          <mc:Fallback>
+            <p:sp>
+              <p:nvSpPr>
+                <p:cNvPr id="52" name="Textfeld 51"/>
+                <p:cNvSpPr txBox="1">
+                  <a:spLocks noRot="1" noChangeAspect="1" noMove="1" noResize="1" noEditPoints="1" noAdjustHandles="1" noChangeArrowheads="1" noChangeShapeType="1" noTextEdit="1"/>
+                </p:cNvSpPr>
+                <p:nvPr/>
+              </p:nvSpPr>
+              <p:spPr>
+                <a:xfrm>
+                  <a:off x="6358517" y="4018759"/>
+                  <a:ext cx="459228" cy="400110"/>
+                </a:xfrm>
+                <a:prstGeom prst="rect">
+                  <a:avLst/>
+                </a:prstGeom>
+                <a:blipFill rotWithShape="1">
+                  <a:blip r:embed="rId4"/>
+                  <a:stretch>
+                    <a:fillRect/>
+                  </a:stretch>
+                </a:blipFill>
+              </p:spPr>
+              <p:txBody>
+                <a:bodyPr/>
+                <a:lstStyle/>
+                <a:p>
+                  <a:r>
+                    <a:rPr lang="en-US">
+                      <a:noFill/>
+                    </a:rPr>
+                    <a:t> </a:t>
+                  </a:r>
+                </a:p>
+              </p:txBody>
+            </p:sp>
+          </mc:Fallback>
+        </mc:AlternateContent>
       </p:grpSp>
     </p:spTree>
     <p:extLst>
@@ -18875,6 +19081,1510 @@
     <p:extLst>
       <p:ext uri="{BB962C8B-B14F-4D97-AF65-F5344CB8AC3E}">
         <p14:creationId xmlns:p14="http://schemas.microsoft.com/office/powerpoint/2010/main" val="162627250"/>
+      </p:ext>
+    </p:extLst>
+  </p:cSld>
+  <p:clrMapOvr>
+    <a:masterClrMapping/>
+  </p:clrMapOvr>
+</p:sld>
+</file>
+
+<file path=ppt/slides/slide33.xml><?xml version="1.0" encoding="utf-8"?>
+<p:sld xmlns:a="http://schemas.openxmlformats.org/drawingml/2006/main" xmlns:r="http://schemas.openxmlformats.org/officeDocument/2006/relationships" xmlns:p="http://schemas.openxmlformats.org/presentationml/2006/main">
+  <p:cSld>
+    <p:spTree>
+      <p:nvGrpSpPr>
+        <p:cNvPr id="1" name=""/>
+        <p:cNvGrpSpPr/>
+        <p:nvPr/>
+      </p:nvGrpSpPr>
+      <p:grpSpPr>
+        <a:xfrm>
+          <a:off x="0" y="0"/>
+          <a:ext cx="0" cy="0"/>
+          <a:chOff x="0" y="0"/>
+          <a:chExt cx="0" cy="0"/>
+        </a:xfrm>
+      </p:grpSpPr>
+      <p:grpSp>
+        <p:nvGrpSpPr>
+          <p:cNvPr id="24" name="Gruppieren 23"/>
+          <p:cNvGrpSpPr/>
+          <p:nvPr/>
+        </p:nvGrpSpPr>
+        <p:grpSpPr>
+          <a:xfrm>
+            <a:off x="251520" y="2928259"/>
+            <a:ext cx="8712946" cy="936104"/>
+            <a:chOff x="251520" y="2928259"/>
+            <a:chExt cx="8712946" cy="936104"/>
+          </a:xfrm>
+        </p:grpSpPr>
+        <p:sp>
+          <p:nvSpPr>
+            <p:cNvPr id="6" name="Rechteck 5"/>
+            <p:cNvSpPr/>
+            <p:nvPr/>
+          </p:nvSpPr>
+          <p:spPr>
+            <a:xfrm>
+              <a:off x="251520" y="2928259"/>
+              <a:ext cx="1584176" cy="936104"/>
+            </a:xfrm>
+            <a:prstGeom prst="rect">
+              <a:avLst/>
+            </a:prstGeom>
+          </p:spPr>
+          <p:style>
+            <a:lnRef idx="1">
+              <a:schemeClr val="accent5"/>
+            </a:lnRef>
+            <a:fillRef idx="2">
+              <a:schemeClr val="accent5"/>
+            </a:fillRef>
+            <a:effectRef idx="1">
+              <a:schemeClr val="accent5"/>
+            </a:effectRef>
+            <a:fontRef idx="minor">
+              <a:schemeClr val="dk1"/>
+            </a:fontRef>
+          </p:style>
+          <p:txBody>
+            <a:bodyPr rtlCol="0" anchor="ctr"/>
+            <a:lstStyle/>
+            <a:p>
+              <a:pPr algn="ctr"/>
+              <a:r>
+                <a:rPr lang="de-DE" dirty="0" err="1" smtClean="0"/>
+                <a:t>Window</a:t>
+              </a:r>
+              <a:r>
+                <a:rPr lang="de-DE" dirty="0" smtClean="0"/>
+                <a:t> </a:t>
+              </a:r>
+              <a:r>
+                <a:rPr lang="de-DE" dirty="0" err="1" smtClean="0"/>
+                <a:t>Function</a:t>
+              </a:r>
+              <a:endParaRPr lang="en-US" dirty="0"/>
+            </a:p>
+          </p:txBody>
+        </p:sp>
+        <p:sp>
+          <p:nvSpPr>
+            <p:cNvPr id="7" name="Rechteck 6"/>
+            <p:cNvSpPr/>
+            <p:nvPr/>
+          </p:nvSpPr>
+          <p:spPr>
+            <a:xfrm>
+              <a:off x="3815906" y="2928259"/>
+              <a:ext cx="1584176" cy="936104"/>
+            </a:xfrm>
+            <a:prstGeom prst="rect">
+              <a:avLst/>
+            </a:prstGeom>
+          </p:spPr>
+          <p:style>
+            <a:lnRef idx="1">
+              <a:schemeClr val="accent5"/>
+            </a:lnRef>
+            <a:fillRef idx="2">
+              <a:schemeClr val="accent5"/>
+            </a:fillRef>
+            <a:effectRef idx="1">
+              <a:schemeClr val="accent5"/>
+            </a:effectRef>
+            <a:fontRef idx="minor">
+              <a:schemeClr val="dk1"/>
+            </a:fontRef>
+          </p:style>
+          <p:txBody>
+            <a:bodyPr rtlCol="0" anchor="ctr"/>
+            <a:lstStyle/>
+            <a:p>
+              <a:pPr algn="ctr"/>
+              <a:r>
+                <a:rPr lang="de-DE" dirty="0" smtClean="0"/>
+                <a:t>FFT</a:t>
+              </a:r>
+              <a:endParaRPr lang="en-US" dirty="0"/>
+            </a:p>
+          </p:txBody>
+        </p:sp>
+        <p:sp>
+          <p:nvSpPr>
+            <p:cNvPr id="8" name="Rechteck 7"/>
+            <p:cNvSpPr/>
+            <p:nvPr/>
+          </p:nvSpPr>
+          <p:spPr>
+            <a:xfrm>
+              <a:off x="5598099" y="2928259"/>
+              <a:ext cx="1584176" cy="936104"/>
+            </a:xfrm>
+            <a:prstGeom prst="rect">
+              <a:avLst/>
+            </a:prstGeom>
+          </p:spPr>
+          <p:style>
+            <a:lnRef idx="1">
+              <a:schemeClr val="accent5"/>
+            </a:lnRef>
+            <a:fillRef idx="2">
+              <a:schemeClr val="accent5"/>
+            </a:fillRef>
+            <a:effectRef idx="1">
+              <a:schemeClr val="accent5"/>
+            </a:effectRef>
+            <a:fontRef idx="minor">
+              <a:schemeClr val="dk1"/>
+            </a:fontRef>
+          </p:style>
+          <p:txBody>
+            <a:bodyPr rtlCol="0" anchor="ctr"/>
+            <a:lstStyle/>
+            <a:p>
+              <a:pPr algn="ctr"/>
+              <a:r>
+                <a:rPr lang="de-DE" dirty="0" smtClean="0"/>
+                <a:t>Ideal Filter</a:t>
+              </a:r>
+              <a:endParaRPr lang="en-US" dirty="0"/>
+            </a:p>
+          </p:txBody>
+        </p:sp>
+        <p:cxnSp>
+          <p:nvCxnSpPr>
+            <p:cNvPr id="9" name="Gerade Verbindung mit Pfeil 8"/>
+            <p:cNvCxnSpPr>
+              <a:stCxn id="8" idx="3"/>
+              <a:endCxn id="14" idx="1"/>
+            </p:cNvCxnSpPr>
+            <p:nvPr/>
+          </p:nvCxnSpPr>
+          <p:spPr>
+            <a:xfrm>
+              <a:off x="7182275" y="3396311"/>
+              <a:ext cx="198015" cy="0"/>
+            </a:xfrm>
+            <a:prstGeom prst="straightConnector1">
+              <a:avLst/>
+            </a:prstGeom>
+            <a:ln>
+              <a:tailEnd type="arrow"/>
+            </a:ln>
+          </p:spPr>
+          <p:style>
+            <a:lnRef idx="2">
+              <a:schemeClr val="accent1"/>
+            </a:lnRef>
+            <a:fillRef idx="0">
+              <a:schemeClr val="accent1"/>
+            </a:fillRef>
+            <a:effectRef idx="1">
+              <a:schemeClr val="accent1"/>
+            </a:effectRef>
+            <a:fontRef idx="minor">
+              <a:schemeClr val="tx1"/>
+            </a:fontRef>
+          </p:style>
+        </p:cxnSp>
+        <p:cxnSp>
+          <p:nvCxnSpPr>
+            <p:cNvPr id="10" name="Gerade Verbindung mit Pfeil 9"/>
+            <p:cNvCxnSpPr>
+              <a:stCxn id="6" idx="3"/>
+              <a:endCxn id="12" idx="1"/>
+            </p:cNvCxnSpPr>
+            <p:nvPr/>
+          </p:nvCxnSpPr>
+          <p:spPr>
+            <a:xfrm>
+              <a:off x="1835696" y="3396311"/>
+              <a:ext cx="198017" cy="0"/>
+            </a:xfrm>
+            <a:prstGeom prst="straightConnector1">
+              <a:avLst/>
+            </a:prstGeom>
+            <a:ln>
+              <a:tailEnd type="arrow"/>
+            </a:ln>
+          </p:spPr>
+          <p:style>
+            <a:lnRef idx="2">
+              <a:schemeClr val="accent1"/>
+            </a:lnRef>
+            <a:fillRef idx="0">
+              <a:schemeClr val="accent1"/>
+            </a:fillRef>
+            <a:effectRef idx="1">
+              <a:schemeClr val="accent1"/>
+            </a:effectRef>
+            <a:fontRef idx="minor">
+              <a:schemeClr val="tx1"/>
+            </a:fontRef>
+          </p:style>
+        </p:cxnSp>
+        <p:cxnSp>
+          <p:nvCxnSpPr>
+            <p:cNvPr id="11" name="Gerade Verbindung mit Pfeil 10"/>
+            <p:cNvCxnSpPr>
+              <a:stCxn id="7" idx="3"/>
+              <a:endCxn id="8" idx="1"/>
+            </p:cNvCxnSpPr>
+            <p:nvPr/>
+          </p:nvCxnSpPr>
+          <p:spPr>
+            <a:xfrm>
+              <a:off x="5400082" y="3396311"/>
+              <a:ext cx="198017" cy="0"/>
+            </a:xfrm>
+            <a:prstGeom prst="straightConnector1">
+              <a:avLst/>
+            </a:prstGeom>
+            <a:ln>
+              <a:tailEnd type="arrow"/>
+            </a:ln>
+          </p:spPr>
+          <p:style>
+            <a:lnRef idx="2">
+              <a:schemeClr val="accent1"/>
+            </a:lnRef>
+            <a:fillRef idx="0">
+              <a:schemeClr val="accent1"/>
+            </a:fillRef>
+            <a:effectRef idx="1">
+              <a:schemeClr val="accent1"/>
+            </a:effectRef>
+            <a:fontRef idx="minor">
+              <a:schemeClr val="tx1"/>
+            </a:fontRef>
+          </p:style>
+        </p:cxnSp>
+        <p:sp>
+          <p:nvSpPr>
+            <p:cNvPr id="12" name="Rechteck 11"/>
+            <p:cNvSpPr/>
+            <p:nvPr/>
+          </p:nvSpPr>
+          <p:spPr>
+            <a:xfrm>
+              <a:off x="2033713" y="2928259"/>
+              <a:ext cx="1584176" cy="936104"/>
+            </a:xfrm>
+            <a:prstGeom prst="rect">
+              <a:avLst/>
+            </a:prstGeom>
+          </p:spPr>
+          <p:style>
+            <a:lnRef idx="1">
+              <a:schemeClr val="accent5"/>
+            </a:lnRef>
+            <a:fillRef idx="2">
+              <a:schemeClr val="accent5"/>
+            </a:fillRef>
+            <a:effectRef idx="1">
+              <a:schemeClr val="accent5"/>
+            </a:effectRef>
+            <a:fontRef idx="minor">
+              <a:schemeClr val="dk1"/>
+            </a:fontRef>
+          </p:style>
+          <p:txBody>
+            <a:bodyPr rtlCol="0" anchor="ctr"/>
+            <a:lstStyle/>
+            <a:p>
+              <a:pPr algn="ctr"/>
+              <a:r>
+                <a:rPr lang="de-DE" dirty="0" smtClean="0"/>
+                <a:t>Zero </a:t>
+              </a:r>
+              <a:r>
+                <a:rPr lang="de-DE" dirty="0" err="1" smtClean="0"/>
+                <a:t>Padding</a:t>
+              </a:r>
+              <a:endParaRPr lang="en-US" dirty="0"/>
+            </a:p>
+          </p:txBody>
+        </p:sp>
+        <p:cxnSp>
+          <p:nvCxnSpPr>
+            <p:cNvPr id="13" name="Gerade Verbindung mit Pfeil 12"/>
+            <p:cNvCxnSpPr>
+              <a:stCxn id="12" idx="3"/>
+              <a:endCxn id="7" idx="1"/>
+            </p:cNvCxnSpPr>
+            <p:nvPr/>
+          </p:nvCxnSpPr>
+          <p:spPr>
+            <a:xfrm>
+              <a:off x="3617889" y="3396311"/>
+              <a:ext cx="198017" cy="0"/>
+            </a:xfrm>
+            <a:prstGeom prst="straightConnector1">
+              <a:avLst/>
+            </a:prstGeom>
+            <a:ln>
+              <a:tailEnd type="arrow"/>
+            </a:ln>
+          </p:spPr>
+          <p:style>
+            <a:lnRef idx="2">
+              <a:schemeClr val="accent1"/>
+            </a:lnRef>
+            <a:fillRef idx="0">
+              <a:schemeClr val="accent1"/>
+            </a:fillRef>
+            <a:effectRef idx="1">
+              <a:schemeClr val="accent1"/>
+            </a:effectRef>
+            <a:fontRef idx="minor">
+              <a:schemeClr val="tx1"/>
+            </a:fontRef>
+          </p:style>
+        </p:cxnSp>
+        <p:sp>
+          <p:nvSpPr>
+            <p:cNvPr id="14" name="Rechteck 13"/>
+            <p:cNvSpPr/>
+            <p:nvPr/>
+          </p:nvSpPr>
+          <p:spPr>
+            <a:xfrm>
+              <a:off x="7380290" y="2928259"/>
+              <a:ext cx="1584176" cy="936104"/>
+            </a:xfrm>
+            <a:prstGeom prst="rect">
+              <a:avLst/>
+            </a:prstGeom>
+          </p:spPr>
+          <p:style>
+            <a:lnRef idx="1">
+              <a:schemeClr val="accent5"/>
+            </a:lnRef>
+            <a:fillRef idx="2">
+              <a:schemeClr val="accent5"/>
+            </a:fillRef>
+            <a:effectRef idx="1">
+              <a:schemeClr val="accent5"/>
+            </a:effectRef>
+            <a:fontRef idx="minor">
+              <a:schemeClr val="dk1"/>
+            </a:fontRef>
+          </p:style>
+          <p:txBody>
+            <a:bodyPr rtlCol="0" anchor="ctr"/>
+            <a:lstStyle/>
+            <a:p>
+              <a:pPr algn="ctr"/>
+              <a:r>
+                <a:rPr lang="de-DE" dirty="0" err="1"/>
+                <a:t>Converting</a:t>
+              </a:r>
+              <a:r>
+                <a:rPr lang="de-DE" dirty="0"/>
+                <a:t>/</a:t>
+              </a:r>
+            </a:p>
+            <a:p>
+              <a:pPr algn="ctr"/>
+              <a:r>
+                <a:rPr lang="de-DE" dirty="0" err="1" smtClean="0"/>
+                <a:t>Scaling</a:t>
+              </a:r>
+              <a:endParaRPr lang="en-US" dirty="0"/>
+            </a:p>
+          </p:txBody>
+        </p:sp>
+      </p:grpSp>
+    </p:spTree>
+    <p:extLst>
+      <p:ext uri="{BB962C8B-B14F-4D97-AF65-F5344CB8AC3E}">
+        <p14:creationId xmlns:p14="http://schemas.microsoft.com/office/powerpoint/2010/main" val="320839070"/>
+      </p:ext>
+    </p:extLst>
+  </p:cSld>
+  <p:clrMapOvr>
+    <a:masterClrMapping/>
+  </p:clrMapOvr>
+</p:sld>
+</file>
+
+<file path=ppt/slides/slide34.xml><?xml version="1.0" encoding="utf-8"?>
+<p:sld xmlns:a="http://schemas.openxmlformats.org/drawingml/2006/main" xmlns:r="http://schemas.openxmlformats.org/officeDocument/2006/relationships" xmlns:p="http://schemas.openxmlformats.org/presentationml/2006/main">
+  <p:cSld>
+    <p:spTree>
+      <p:nvGrpSpPr>
+        <p:cNvPr id="1" name=""/>
+        <p:cNvGrpSpPr/>
+        <p:nvPr/>
+      </p:nvGrpSpPr>
+      <p:grpSpPr>
+        <a:xfrm>
+          <a:off x="0" y="0"/>
+          <a:ext cx="0" cy="0"/>
+          <a:chOff x="0" y="0"/>
+          <a:chExt cx="0" cy="0"/>
+        </a:xfrm>
+      </p:grpSpPr>
+      <p:grpSp>
+        <p:nvGrpSpPr>
+          <p:cNvPr id="34" name="Gruppieren 33"/>
+          <p:cNvGrpSpPr/>
+          <p:nvPr/>
+        </p:nvGrpSpPr>
+        <p:grpSpPr>
+          <a:xfrm>
+            <a:off x="1296144" y="1412776"/>
+            <a:ext cx="6012160" cy="3744416"/>
+            <a:chOff x="1296144" y="1412776"/>
+            <a:chExt cx="6012160" cy="3744416"/>
+          </a:xfrm>
+        </p:grpSpPr>
+        <p:sp>
+          <p:nvSpPr>
+            <p:cNvPr id="4" name="Textfeld 3"/>
+            <p:cNvSpPr txBox="1"/>
+            <p:nvPr/>
+          </p:nvSpPr>
+          <p:spPr>
+            <a:xfrm>
+              <a:off x="5425816" y="4787860"/>
+              <a:ext cx="1532727" cy="369332"/>
+            </a:xfrm>
+            <a:prstGeom prst="rect">
+              <a:avLst/>
+            </a:prstGeom>
+            <a:noFill/>
+          </p:spPr>
+          <p:txBody>
+            <a:bodyPr wrap="none" rtlCol="0">
+              <a:spAutoFit/>
+            </a:bodyPr>
+            <a:lstStyle/>
+            <a:p>
+              <a:r>
+                <a:rPr lang="de-DE" dirty="0" smtClean="0"/>
+                <a:t>Light </a:t>
+              </a:r>
+              <a:r>
+                <a:rPr lang="de-DE" dirty="0" err="1" smtClean="0"/>
+                <a:t>reflected</a:t>
+              </a:r>
+              <a:endParaRPr lang="en-US" dirty="0"/>
+            </a:p>
+          </p:txBody>
+        </p:sp>
+        <p:sp>
+          <p:nvSpPr>
+            <p:cNvPr id="5" name="Textfeld 4"/>
+            <p:cNvSpPr txBox="1"/>
+            <p:nvPr/>
+          </p:nvSpPr>
+          <p:spPr>
+            <a:xfrm>
+              <a:off x="2595286" y="4787860"/>
+              <a:ext cx="1865191" cy="369332"/>
+            </a:xfrm>
+            <a:prstGeom prst="rect">
+              <a:avLst/>
+            </a:prstGeom>
+            <a:noFill/>
+          </p:spPr>
+          <p:txBody>
+            <a:bodyPr wrap="none" rtlCol="0">
+              <a:spAutoFit/>
+            </a:bodyPr>
+            <a:lstStyle/>
+            <a:p>
+              <a:r>
+                <a:rPr lang="de-DE" dirty="0" smtClean="0"/>
+                <a:t>Light </a:t>
+              </a:r>
+              <a:r>
+                <a:rPr lang="de-DE" dirty="0" err="1" smtClean="0"/>
+                <a:t>through</a:t>
+              </a:r>
+              <a:r>
+                <a:rPr lang="de-DE" dirty="0" smtClean="0"/>
+                <a:t> </a:t>
+              </a:r>
+              <a:r>
+                <a:rPr lang="de-DE" dirty="0" err="1" smtClean="0"/>
+                <a:t>skin</a:t>
+              </a:r>
+              <a:endParaRPr lang="en-US" dirty="0"/>
+            </a:p>
+          </p:txBody>
+        </p:sp>
+        <p:cxnSp>
+          <p:nvCxnSpPr>
+            <p:cNvPr id="6" name="Gerade Verbindung 5"/>
+            <p:cNvCxnSpPr/>
+            <p:nvPr/>
+          </p:nvCxnSpPr>
+          <p:spPr>
+            <a:xfrm>
+              <a:off x="4860032" y="1412776"/>
+              <a:ext cx="0" cy="3744416"/>
+            </a:xfrm>
+            <a:prstGeom prst="line">
+              <a:avLst/>
+            </a:prstGeom>
+          </p:spPr>
+          <p:style>
+            <a:lnRef idx="3">
+              <a:schemeClr val="dk1"/>
+            </a:lnRef>
+            <a:fillRef idx="0">
+              <a:schemeClr val="dk1"/>
+            </a:fillRef>
+            <a:effectRef idx="2">
+              <a:schemeClr val="dk1"/>
+            </a:effectRef>
+            <a:fontRef idx="minor">
+              <a:schemeClr val="tx1"/>
+            </a:fontRef>
+          </p:style>
+        </p:cxnSp>
+        <p:grpSp>
+          <p:nvGrpSpPr>
+            <p:cNvPr id="7" name="Gruppieren 6"/>
+            <p:cNvGrpSpPr/>
+            <p:nvPr/>
+          </p:nvGrpSpPr>
+          <p:grpSpPr>
+            <a:xfrm>
+              <a:off x="1296144" y="1849179"/>
+              <a:ext cx="3347864" cy="2371909"/>
+              <a:chOff x="504056" y="2065203"/>
+              <a:chExt cx="3347864" cy="2371909"/>
+            </a:xfrm>
+          </p:grpSpPr>
+          <p:sp>
+            <p:nvSpPr>
+              <p:cNvPr id="8" name="Sonne 7"/>
+              <p:cNvSpPr/>
+              <p:nvPr/>
+            </p:nvSpPr>
+            <p:spPr>
+              <a:xfrm>
+                <a:off x="2411760" y="2065203"/>
+                <a:ext cx="648072" cy="648072"/>
+              </a:xfrm>
+              <a:prstGeom prst="sun">
+                <a:avLst/>
+              </a:prstGeom>
+              <a:solidFill>
+                <a:srgbClr val="FF0000"/>
+              </a:solidFill>
+              <a:ln>
+                <a:noFill/>
+              </a:ln>
+            </p:spPr>
+            <p:style>
+              <a:lnRef idx="2">
+                <a:schemeClr val="accent2">
+                  <a:shade val="50000"/>
+                </a:schemeClr>
+              </a:lnRef>
+              <a:fillRef idx="1">
+                <a:schemeClr val="accent2"/>
+              </a:fillRef>
+              <a:effectRef idx="0">
+                <a:schemeClr val="accent2"/>
+              </a:effectRef>
+              <a:fontRef idx="minor">
+                <a:schemeClr val="lt1"/>
+              </a:fontRef>
+            </p:style>
+            <p:txBody>
+              <a:bodyPr rtlCol="0" anchor="ctr"/>
+              <a:lstStyle/>
+              <a:p>
+                <a:pPr algn="ctr"/>
+                <a:endParaRPr lang="en-US"/>
+              </a:p>
+            </p:txBody>
+          </p:sp>
+          <p:grpSp>
+            <p:nvGrpSpPr>
+              <p:cNvPr id="9" name="Gruppieren 8"/>
+              <p:cNvGrpSpPr/>
+              <p:nvPr/>
+            </p:nvGrpSpPr>
+            <p:grpSpPr>
+              <a:xfrm rot="10800000">
+                <a:off x="2326307" y="4090428"/>
+                <a:ext cx="818976" cy="270030"/>
+                <a:chOff x="7080793" y="2060848"/>
+                <a:chExt cx="818976" cy="270030"/>
+              </a:xfrm>
+            </p:grpSpPr>
+            <p:sp>
+              <p:nvSpPr>
+                <p:cNvPr id="21" name="Rechteck 20"/>
+                <p:cNvSpPr/>
+                <p:nvPr/>
+              </p:nvSpPr>
+              <p:spPr>
+                <a:xfrm>
+                  <a:off x="7080793" y="2060848"/>
+                  <a:ext cx="818976" cy="216024"/>
+                </a:xfrm>
+                <a:prstGeom prst="rect">
+                  <a:avLst/>
+                </a:prstGeom>
+                <a:solidFill>
+                  <a:srgbClr val="00B050"/>
+                </a:solidFill>
+              </p:spPr>
+              <p:style>
+                <a:lnRef idx="2">
+                  <a:schemeClr val="accent1">
+                    <a:shade val="50000"/>
+                  </a:schemeClr>
+                </a:lnRef>
+                <a:fillRef idx="1">
+                  <a:schemeClr val="accent1"/>
+                </a:fillRef>
+                <a:effectRef idx="0">
+                  <a:schemeClr val="accent1"/>
+                </a:effectRef>
+                <a:fontRef idx="minor">
+                  <a:schemeClr val="lt1"/>
+                </a:fontRef>
+              </p:style>
+              <p:txBody>
+                <a:bodyPr rtlCol="0" anchor="ctr"/>
+                <a:lstStyle/>
+                <a:p>
+                  <a:pPr algn="ctr"/>
+                  <a:endParaRPr lang="en-US"/>
+                </a:p>
+              </p:txBody>
+            </p:sp>
+            <p:sp>
+              <p:nvSpPr>
+                <p:cNvPr id="22" name="Rechteck 21"/>
+                <p:cNvSpPr/>
+                <p:nvPr/>
+              </p:nvSpPr>
+              <p:spPr>
+                <a:xfrm>
+                  <a:off x="7321747" y="2222866"/>
+                  <a:ext cx="337067" cy="108012"/>
+                </a:xfrm>
+                <a:prstGeom prst="rect">
+                  <a:avLst/>
+                </a:prstGeom>
+                <a:solidFill>
+                  <a:schemeClr val="tx1"/>
+                </a:solidFill>
+                <a:ln>
+                  <a:solidFill>
+                    <a:schemeClr val="tx1"/>
+                  </a:solidFill>
+                </a:ln>
+              </p:spPr>
+              <p:style>
+                <a:lnRef idx="2">
+                  <a:schemeClr val="accent1">
+                    <a:shade val="50000"/>
+                  </a:schemeClr>
+                </a:lnRef>
+                <a:fillRef idx="1">
+                  <a:schemeClr val="accent1"/>
+                </a:fillRef>
+                <a:effectRef idx="0">
+                  <a:schemeClr val="accent1"/>
+                </a:effectRef>
+                <a:fontRef idx="minor">
+                  <a:schemeClr val="lt1"/>
+                </a:fontRef>
+              </p:style>
+              <p:txBody>
+                <a:bodyPr rtlCol="0" anchor="ctr"/>
+                <a:lstStyle/>
+                <a:p>
+                  <a:pPr algn="ctr"/>
+                  <a:endParaRPr lang="en-US"/>
+                </a:p>
+              </p:txBody>
+            </p:sp>
+          </p:grpSp>
+          <p:sp>
+            <p:nvSpPr>
+              <p:cNvPr id="10" name="Abgerundetes Rechteck 9"/>
+              <p:cNvSpPr/>
+              <p:nvPr/>
+            </p:nvSpPr>
+            <p:spPr>
+              <a:xfrm>
+                <a:off x="1619672" y="2946684"/>
+                <a:ext cx="2232248" cy="864096"/>
+              </a:xfrm>
+              <a:prstGeom prst="roundRect">
+                <a:avLst/>
+              </a:prstGeom>
+              <a:solidFill>
+                <a:schemeClr val="accent6">
+                  <a:lumMod val="40000"/>
+                  <a:lumOff val="60000"/>
+                </a:schemeClr>
+              </a:solidFill>
+              <a:ln>
+                <a:solidFill>
+                  <a:schemeClr val="tx1"/>
+                </a:solidFill>
+              </a:ln>
+            </p:spPr>
+            <p:style>
+              <a:lnRef idx="2">
+                <a:schemeClr val="accent1">
+                  <a:shade val="50000"/>
+                </a:schemeClr>
+              </a:lnRef>
+              <a:fillRef idx="1">
+                <a:schemeClr val="accent1"/>
+              </a:fillRef>
+              <a:effectRef idx="0">
+                <a:schemeClr val="accent1"/>
+              </a:effectRef>
+              <a:fontRef idx="minor">
+                <a:schemeClr val="lt1"/>
+              </a:fontRef>
+            </p:style>
+            <p:txBody>
+              <a:bodyPr rtlCol="0" anchor="ctr"/>
+              <a:lstStyle/>
+              <a:p>
+                <a:pPr algn="ctr"/>
+                <a:endParaRPr lang="en-US"/>
+              </a:p>
+            </p:txBody>
+          </p:sp>
+          <p:cxnSp>
+            <p:nvCxnSpPr>
+              <p:cNvPr id="11" name="Gerade Verbindung mit Pfeil 10"/>
+              <p:cNvCxnSpPr/>
+              <p:nvPr/>
+            </p:nvCxnSpPr>
+            <p:spPr>
+              <a:xfrm>
+                <a:off x="2735796" y="2857291"/>
+                <a:ext cx="0" cy="1152000"/>
+              </a:xfrm>
+              <a:prstGeom prst="straightConnector1">
+                <a:avLst/>
+              </a:prstGeom>
+              <a:ln w="19050">
+                <a:solidFill>
+                  <a:srgbClr val="FF0000"/>
+                </a:solidFill>
+                <a:tailEnd type="arrow"/>
+              </a:ln>
+            </p:spPr>
+            <p:style>
+              <a:lnRef idx="1">
+                <a:schemeClr val="accent1"/>
+              </a:lnRef>
+              <a:fillRef idx="0">
+                <a:schemeClr val="accent1"/>
+              </a:fillRef>
+              <a:effectRef idx="0">
+                <a:schemeClr val="accent1"/>
+              </a:effectRef>
+              <a:fontRef idx="minor">
+                <a:schemeClr val="tx1"/>
+              </a:fontRef>
+            </p:style>
+          </p:cxnSp>
+          <p:cxnSp>
+            <p:nvCxnSpPr>
+              <p:cNvPr id="12" name="Gerade Verbindung mit Pfeil 11"/>
+              <p:cNvCxnSpPr/>
+              <p:nvPr/>
+            </p:nvCxnSpPr>
+            <p:spPr>
+              <a:xfrm>
+                <a:off x="2567261" y="2857291"/>
+                <a:ext cx="0" cy="1152000"/>
+              </a:xfrm>
+              <a:prstGeom prst="straightConnector1">
+                <a:avLst/>
+              </a:prstGeom>
+              <a:ln w="19050">
+                <a:solidFill>
+                  <a:srgbClr val="FF0000"/>
+                </a:solidFill>
+                <a:tailEnd type="arrow"/>
+              </a:ln>
+            </p:spPr>
+            <p:style>
+              <a:lnRef idx="1">
+                <a:schemeClr val="accent1"/>
+              </a:lnRef>
+              <a:fillRef idx="0">
+                <a:schemeClr val="accent1"/>
+              </a:fillRef>
+              <a:effectRef idx="0">
+                <a:schemeClr val="accent1"/>
+              </a:effectRef>
+              <a:fontRef idx="minor">
+                <a:schemeClr val="tx1"/>
+              </a:fontRef>
+            </p:style>
+          </p:cxnSp>
+          <p:cxnSp>
+            <p:nvCxnSpPr>
+              <p:cNvPr id="13" name="Gerade Verbindung mit Pfeil 12"/>
+              <p:cNvCxnSpPr/>
+              <p:nvPr/>
+            </p:nvCxnSpPr>
+            <p:spPr>
+              <a:xfrm>
+                <a:off x="2910918" y="2865394"/>
+                <a:ext cx="0" cy="1152000"/>
+              </a:xfrm>
+              <a:prstGeom prst="straightConnector1">
+                <a:avLst/>
+              </a:prstGeom>
+              <a:ln w="19050">
+                <a:solidFill>
+                  <a:srgbClr val="FF0000"/>
+                </a:solidFill>
+                <a:tailEnd type="arrow"/>
+              </a:ln>
+            </p:spPr>
+            <p:style>
+              <a:lnRef idx="1">
+                <a:schemeClr val="accent1"/>
+              </a:lnRef>
+              <a:fillRef idx="0">
+                <a:schemeClr val="accent1"/>
+              </a:fillRef>
+              <a:effectRef idx="0">
+                <a:schemeClr val="accent1"/>
+              </a:effectRef>
+              <a:fontRef idx="minor">
+                <a:schemeClr val="tx1"/>
+              </a:fontRef>
+            </p:style>
+          </p:cxnSp>
+          <p:sp>
+            <p:nvSpPr>
+              <p:cNvPr id="14" name="Textfeld 13"/>
+              <p:cNvSpPr txBox="1"/>
+              <p:nvPr/>
+            </p:nvSpPr>
+            <p:spPr>
+              <a:xfrm>
+                <a:off x="504056" y="2204573"/>
+                <a:ext cx="1362040" cy="369332"/>
+              </a:xfrm>
+              <a:prstGeom prst="rect">
+                <a:avLst/>
+              </a:prstGeom>
+              <a:noFill/>
+            </p:spPr>
+            <p:txBody>
+              <a:bodyPr wrap="none" rtlCol="0">
+                <a:spAutoFit/>
+              </a:bodyPr>
+              <a:lstStyle/>
+              <a:p>
+                <a:r>
+                  <a:rPr lang="de-DE" dirty="0" smtClean="0"/>
+                  <a:t>LED (</a:t>
+                </a:r>
+                <a:r>
+                  <a:rPr lang="de-DE" dirty="0" err="1" smtClean="0"/>
+                  <a:t>Red</a:t>
+                </a:r>
+                <a:r>
+                  <a:rPr lang="de-DE" dirty="0" smtClean="0"/>
+                  <a:t>/IR)</a:t>
+                </a:r>
+                <a:endParaRPr lang="en-US" dirty="0"/>
+              </a:p>
+            </p:txBody>
+          </p:sp>
+          <p:sp>
+            <p:nvSpPr>
+              <p:cNvPr id="15" name="Textfeld 14"/>
+              <p:cNvSpPr txBox="1"/>
+              <p:nvPr/>
+            </p:nvSpPr>
+            <p:spPr>
+              <a:xfrm>
+                <a:off x="615689" y="4067780"/>
+                <a:ext cx="1277273" cy="369332"/>
+              </a:xfrm>
+              <a:prstGeom prst="rect">
+                <a:avLst/>
+              </a:prstGeom>
+              <a:noFill/>
+            </p:spPr>
+            <p:txBody>
+              <a:bodyPr wrap="none" rtlCol="0">
+                <a:spAutoFit/>
+              </a:bodyPr>
+              <a:lstStyle/>
+              <a:p>
+                <a:r>
+                  <a:rPr lang="de-DE" dirty="0" err="1" smtClean="0"/>
+                  <a:t>Photodiode</a:t>
+                </a:r>
+                <a:endParaRPr lang="en-US" dirty="0"/>
+              </a:p>
+            </p:txBody>
+          </p:sp>
+          <p:sp>
+            <p:nvSpPr>
+              <p:cNvPr id="16" name="Textfeld 15"/>
+              <p:cNvSpPr txBox="1"/>
+              <p:nvPr/>
+            </p:nvSpPr>
+            <p:spPr>
+              <a:xfrm>
+                <a:off x="610267" y="3194066"/>
+                <a:ext cx="569387" cy="369332"/>
+              </a:xfrm>
+              <a:prstGeom prst="rect">
+                <a:avLst/>
+              </a:prstGeom>
+              <a:noFill/>
+            </p:spPr>
+            <p:txBody>
+              <a:bodyPr wrap="none" rtlCol="0">
+                <a:spAutoFit/>
+              </a:bodyPr>
+              <a:lstStyle/>
+              <a:p>
+                <a:r>
+                  <a:rPr lang="de-DE" dirty="0" smtClean="0"/>
+                  <a:t>Skin</a:t>
+                </a:r>
+                <a:endParaRPr lang="en-US" dirty="0"/>
+              </a:p>
+            </p:txBody>
+          </p:sp>
+          <p:cxnSp>
+            <p:nvCxnSpPr>
+              <p:cNvPr id="17" name="Gerade Verbindung 16"/>
+              <p:cNvCxnSpPr>
+                <a:stCxn id="14" idx="3"/>
+                <a:endCxn id="8" idx="1"/>
+              </p:cNvCxnSpPr>
+              <p:nvPr/>
+            </p:nvCxnSpPr>
+            <p:spPr>
+              <a:xfrm>
+                <a:off x="1866096" y="2389239"/>
+                <a:ext cx="545664" cy="0"/>
+              </a:xfrm>
+              <a:prstGeom prst="line">
+                <a:avLst/>
+              </a:prstGeom>
+            </p:spPr>
+            <p:style>
+              <a:lnRef idx="1">
+                <a:schemeClr val="dk1"/>
+              </a:lnRef>
+              <a:fillRef idx="0">
+                <a:schemeClr val="dk1"/>
+              </a:fillRef>
+              <a:effectRef idx="0">
+                <a:schemeClr val="dk1"/>
+              </a:effectRef>
+              <a:fontRef idx="minor">
+                <a:schemeClr val="tx1"/>
+              </a:fontRef>
+            </p:style>
+          </p:cxnSp>
+          <p:cxnSp>
+            <p:nvCxnSpPr>
+              <p:cNvPr id="18" name="Gerade Verbindung 17"/>
+              <p:cNvCxnSpPr>
+                <a:stCxn id="16" idx="3"/>
+                <a:endCxn id="10" idx="1"/>
+              </p:cNvCxnSpPr>
+              <p:nvPr/>
+            </p:nvCxnSpPr>
+            <p:spPr>
+              <a:xfrm>
+                <a:off x="1179654" y="3378732"/>
+                <a:ext cx="440018" cy="0"/>
+              </a:xfrm>
+              <a:prstGeom prst="line">
+                <a:avLst/>
+              </a:prstGeom>
+            </p:spPr>
+            <p:style>
+              <a:lnRef idx="1">
+                <a:schemeClr val="dk1"/>
+              </a:lnRef>
+              <a:fillRef idx="0">
+                <a:schemeClr val="dk1"/>
+              </a:fillRef>
+              <a:effectRef idx="0">
+                <a:schemeClr val="dk1"/>
+              </a:effectRef>
+              <a:fontRef idx="minor">
+                <a:schemeClr val="tx1"/>
+              </a:fontRef>
+            </p:style>
+          </p:cxnSp>
+          <p:cxnSp>
+            <p:nvCxnSpPr>
+              <p:cNvPr id="19" name="Gerade Verbindung 18"/>
+              <p:cNvCxnSpPr>
+                <a:stCxn id="15" idx="3"/>
+                <a:endCxn id="21" idx="3"/>
+              </p:cNvCxnSpPr>
+              <p:nvPr/>
+            </p:nvCxnSpPr>
+            <p:spPr>
+              <a:xfrm>
+                <a:off x="1892962" y="4252446"/>
+                <a:ext cx="433345" cy="0"/>
+              </a:xfrm>
+              <a:prstGeom prst="line">
+                <a:avLst/>
+              </a:prstGeom>
+            </p:spPr>
+            <p:style>
+              <a:lnRef idx="1">
+                <a:schemeClr val="dk1"/>
+              </a:lnRef>
+              <a:fillRef idx="0">
+                <a:schemeClr val="dk1"/>
+              </a:fillRef>
+              <a:effectRef idx="0">
+                <a:schemeClr val="dk1"/>
+              </a:effectRef>
+              <a:fontRef idx="minor">
+                <a:schemeClr val="tx1"/>
+              </a:fontRef>
+            </p:style>
+          </p:cxnSp>
+          <p:sp>
+            <p:nvSpPr>
+              <p:cNvPr id="20" name="Rechteck 19"/>
+              <p:cNvSpPr/>
+              <p:nvPr/>
+            </p:nvSpPr>
+            <p:spPr>
+              <a:xfrm>
+                <a:off x="1702441" y="3289339"/>
+                <a:ext cx="2066710" cy="216024"/>
+              </a:xfrm>
+              <a:prstGeom prst="rect">
+                <a:avLst/>
+              </a:prstGeom>
+            </p:spPr>
+            <p:style>
+              <a:lnRef idx="2">
+                <a:schemeClr val="accent2">
+                  <a:shade val="50000"/>
+                </a:schemeClr>
+              </a:lnRef>
+              <a:fillRef idx="1">
+                <a:schemeClr val="accent2"/>
+              </a:fillRef>
+              <a:effectRef idx="0">
+                <a:schemeClr val="accent2"/>
+              </a:effectRef>
+              <a:fontRef idx="minor">
+                <a:schemeClr val="lt1"/>
+              </a:fontRef>
+            </p:style>
+            <p:txBody>
+              <a:bodyPr rtlCol="0" anchor="ctr"/>
+              <a:lstStyle/>
+              <a:p>
+                <a:pPr algn="ctr"/>
+                <a:r>
+                  <a:rPr lang="de-DE" dirty="0" smtClean="0"/>
+                  <a:t>Blood</a:t>
+                </a:r>
+                <a:endParaRPr lang="en-US" dirty="0"/>
+              </a:p>
+            </p:txBody>
+          </p:sp>
+        </p:grpSp>
+        <p:grpSp>
+          <p:nvGrpSpPr>
+            <p:cNvPr id="23" name="Gruppieren 22"/>
+            <p:cNvGrpSpPr/>
+            <p:nvPr/>
+          </p:nvGrpSpPr>
+          <p:grpSpPr>
+            <a:xfrm>
+              <a:off x="5076056" y="1628800"/>
+              <a:ext cx="2232248" cy="2664296"/>
+              <a:chOff x="5653243" y="1844824"/>
+              <a:chExt cx="2232248" cy="2664296"/>
+            </a:xfrm>
+          </p:grpSpPr>
+          <p:sp>
+            <p:nvSpPr>
+              <p:cNvPr id="24" name="Sonne 23"/>
+              <p:cNvSpPr/>
+              <p:nvPr/>
+            </p:nvSpPr>
+            <p:spPr>
+              <a:xfrm>
+                <a:off x="5653243" y="2051847"/>
+                <a:ext cx="648072" cy="648072"/>
+              </a:xfrm>
+              <a:prstGeom prst="sun">
+                <a:avLst/>
+              </a:prstGeom>
+              <a:solidFill>
+                <a:srgbClr val="FF0000"/>
+              </a:solidFill>
+              <a:ln>
+                <a:noFill/>
+              </a:ln>
+            </p:spPr>
+            <p:style>
+              <a:lnRef idx="2">
+                <a:schemeClr val="accent2">
+                  <a:shade val="50000"/>
+                </a:schemeClr>
+              </a:lnRef>
+              <a:fillRef idx="1">
+                <a:schemeClr val="accent2"/>
+              </a:fillRef>
+              <a:effectRef idx="0">
+                <a:schemeClr val="accent2"/>
+              </a:effectRef>
+              <a:fontRef idx="minor">
+                <a:schemeClr val="lt1"/>
+              </a:fontRef>
+            </p:style>
+            <p:txBody>
+              <a:bodyPr rtlCol="0" anchor="ctr"/>
+              <a:lstStyle/>
+              <a:p>
+                <a:pPr algn="ctr"/>
+                <a:endParaRPr lang="en-US"/>
+              </a:p>
+            </p:txBody>
+          </p:sp>
+          <p:grpSp>
+            <p:nvGrpSpPr>
+              <p:cNvPr id="25" name="Gruppieren 24"/>
+              <p:cNvGrpSpPr/>
+              <p:nvPr/>
+            </p:nvGrpSpPr>
+            <p:grpSpPr>
+              <a:xfrm>
+                <a:off x="6937900" y="2267871"/>
+                <a:ext cx="818976" cy="270030"/>
+                <a:chOff x="7080793" y="2060848"/>
+                <a:chExt cx="818976" cy="270030"/>
+              </a:xfrm>
+            </p:grpSpPr>
+            <p:sp>
+              <p:nvSpPr>
+                <p:cNvPr id="31" name="Rechteck 30"/>
+                <p:cNvSpPr/>
+                <p:nvPr/>
+              </p:nvSpPr>
+              <p:spPr>
+                <a:xfrm>
+                  <a:off x="7080793" y="2060848"/>
+                  <a:ext cx="818976" cy="216024"/>
+                </a:xfrm>
+                <a:prstGeom prst="rect">
+                  <a:avLst/>
+                </a:prstGeom>
+                <a:solidFill>
+                  <a:srgbClr val="00B050"/>
+                </a:solidFill>
+              </p:spPr>
+              <p:style>
+                <a:lnRef idx="2">
+                  <a:schemeClr val="accent1">
+                    <a:shade val="50000"/>
+                  </a:schemeClr>
+                </a:lnRef>
+                <a:fillRef idx="1">
+                  <a:schemeClr val="accent1"/>
+                </a:fillRef>
+                <a:effectRef idx="0">
+                  <a:schemeClr val="accent1"/>
+                </a:effectRef>
+                <a:fontRef idx="minor">
+                  <a:schemeClr val="lt1"/>
+                </a:fontRef>
+              </p:style>
+              <p:txBody>
+                <a:bodyPr rtlCol="0" anchor="ctr"/>
+                <a:lstStyle/>
+                <a:p>
+                  <a:pPr algn="ctr"/>
+                  <a:endParaRPr lang="en-US"/>
+                </a:p>
+              </p:txBody>
+            </p:sp>
+            <p:sp>
+              <p:nvSpPr>
+                <p:cNvPr id="32" name="Rechteck 31"/>
+                <p:cNvSpPr/>
+                <p:nvPr/>
+              </p:nvSpPr>
+              <p:spPr>
+                <a:xfrm>
+                  <a:off x="7321747" y="2222866"/>
+                  <a:ext cx="337067" cy="108012"/>
+                </a:xfrm>
+                <a:prstGeom prst="rect">
+                  <a:avLst/>
+                </a:prstGeom>
+                <a:solidFill>
+                  <a:schemeClr val="tx1"/>
+                </a:solidFill>
+                <a:ln>
+                  <a:solidFill>
+                    <a:schemeClr val="tx1"/>
+                  </a:solidFill>
+                </a:ln>
+              </p:spPr>
+              <p:style>
+                <a:lnRef idx="2">
+                  <a:schemeClr val="accent1">
+                    <a:shade val="50000"/>
+                  </a:schemeClr>
+                </a:lnRef>
+                <a:fillRef idx="1">
+                  <a:schemeClr val="accent1"/>
+                </a:fillRef>
+                <a:effectRef idx="0">
+                  <a:schemeClr val="accent1"/>
+                </a:effectRef>
+                <a:fontRef idx="minor">
+                  <a:schemeClr val="lt1"/>
+                </a:fontRef>
+              </p:style>
+              <p:txBody>
+                <a:bodyPr rtlCol="0" anchor="ctr"/>
+                <a:lstStyle/>
+                <a:p>
+                  <a:pPr algn="ctr"/>
+                  <a:endParaRPr lang="en-US"/>
+                </a:p>
+              </p:txBody>
+            </p:sp>
+          </p:grpSp>
+          <p:sp>
+            <p:nvSpPr>
+              <p:cNvPr id="26" name="Abgerundetes Rechteck 25"/>
+              <p:cNvSpPr/>
+              <p:nvPr/>
+            </p:nvSpPr>
+            <p:spPr>
+              <a:xfrm>
+                <a:off x="5653243" y="3645024"/>
+                <a:ext cx="2232248" cy="864096"/>
+              </a:xfrm>
+              <a:prstGeom prst="roundRect">
+                <a:avLst/>
+              </a:prstGeom>
+              <a:solidFill>
+                <a:schemeClr val="accent6">
+                  <a:lumMod val="40000"/>
+                  <a:lumOff val="60000"/>
+                </a:schemeClr>
+              </a:solidFill>
+              <a:ln>
+                <a:solidFill>
+                  <a:schemeClr val="tx1"/>
+                </a:solidFill>
+              </a:ln>
+            </p:spPr>
+            <p:style>
+              <a:lnRef idx="2">
+                <a:schemeClr val="accent1">
+                  <a:shade val="50000"/>
+                </a:schemeClr>
+              </a:lnRef>
+              <a:fillRef idx="1">
+                <a:schemeClr val="accent1"/>
+              </a:fillRef>
+              <a:effectRef idx="0">
+                <a:schemeClr val="accent1"/>
+              </a:effectRef>
+              <a:fontRef idx="minor">
+                <a:schemeClr val="lt1"/>
+              </a:fontRef>
+            </p:style>
+            <p:txBody>
+              <a:bodyPr rtlCol="0" anchor="ctr"/>
+              <a:lstStyle/>
+              <a:p>
+                <a:pPr algn="ctr"/>
+                <a:endParaRPr lang="en-US"/>
+              </a:p>
+            </p:txBody>
+          </p:sp>
+          <p:cxnSp>
+            <p:nvCxnSpPr>
+              <p:cNvPr id="27" name="Gerade Verbindung mit Pfeil 26"/>
+              <p:cNvCxnSpPr/>
+              <p:nvPr/>
+            </p:nvCxnSpPr>
+            <p:spPr>
+              <a:xfrm>
+                <a:off x="6204789" y="2857291"/>
+                <a:ext cx="456566" cy="1066764"/>
+              </a:xfrm>
+              <a:prstGeom prst="straightConnector1">
+                <a:avLst/>
+              </a:prstGeom>
+              <a:ln w="19050">
+                <a:solidFill>
+                  <a:srgbClr val="FF0000"/>
+                </a:solidFill>
+                <a:tailEnd type="arrow"/>
+              </a:ln>
+            </p:spPr>
+            <p:style>
+              <a:lnRef idx="1">
+                <a:schemeClr val="accent1"/>
+              </a:lnRef>
+              <a:fillRef idx="0">
+                <a:schemeClr val="accent1"/>
+              </a:fillRef>
+              <a:effectRef idx="0">
+                <a:schemeClr val="accent1"/>
+              </a:effectRef>
+              <a:fontRef idx="minor">
+                <a:schemeClr val="tx1"/>
+              </a:fontRef>
+            </p:style>
+          </p:cxnSp>
+          <p:cxnSp>
+            <p:nvCxnSpPr>
+              <p:cNvPr id="28" name="Gerade Verbindung mit Pfeil 27"/>
+              <p:cNvCxnSpPr/>
+              <p:nvPr/>
+            </p:nvCxnSpPr>
+            <p:spPr>
+              <a:xfrm flipV="1">
+                <a:off x="6937900" y="2717304"/>
+                <a:ext cx="396044" cy="1206751"/>
+              </a:xfrm>
+              <a:prstGeom prst="straightConnector1">
+                <a:avLst/>
+              </a:prstGeom>
+              <a:ln w="19050">
+                <a:solidFill>
+                  <a:srgbClr val="FF0000"/>
+                </a:solidFill>
+                <a:tailEnd type="arrow"/>
+              </a:ln>
+            </p:spPr>
+            <p:style>
+              <a:lnRef idx="1">
+                <a:schemeClr val="accent1"/>
+              </a:lnRef>
+              <a:fillRef idx="0">
+                <a:schemeClr val="accent1"/>
+              </a:fillRef>
+              <a:effectRef idx="0">
+                <a:schemeClr val="accent1"/>
+              </a:effectRef>
+              <a:fontRef idx="minor">
+                <a:schemeClr val="tx1"/>
+              </a:fontRef>
+            </p:style>
+          </p:cxnSp>
+          <p:cxnSp>
+            <p:nvCxnSpPr>
+              <p:cNvPr id="29" name="Gerade Verbindung 28"/>
+              <p:cNvCxnSpPr/>
+              <p:nvPr/>
+            </p:nvCxnSpPr>
+            <p:spPr>
+              <a:xfrm>
+                <a:off x="6660232" y="1844824"/>
+                <a:ext cx="0" cy="872480"/>
+              </a:xfrm>
+              <a:prstGeom prst="line">
+                <a:avLst/>
+              </a:prstGeom>
+            </p:spPr>
+            <p:style>
+              <a:lnRef idx="2">
+                <a:schemeClr val="dk1"/>
+              </a:lnRef>
+              <a:fillRef idx="0">
+                <a:schemeClr val="dk1"/>
+              </a:fillRef>
+              <a:effectRef idx="1">
+                <a:schemeClr val="dk1"/>
+              </a:effectRef>
+              <a:fontRef idx="minor">
+                <a:schemeClr val="tx1"/>
+              </a:fontRef>
+            </p:style>
+          </p:cxnSp>
+          <p:sp>
+            <p:nvSpPr>
+              <p:cNvPr id="30" name="Rechteck 29"/>
+              <p:cNvSpPr/>
+              <p:nvPr/>
+            </p:nvSpPr>
+            <p:spPr>
+              <a:xfrm>
+                <a:off x="5736012" y="3969060"/>
+                <a:ext cx="2066710" cy="216024"/>
+              </a:xfrm>
+              <a:prstGeom prst="rect">
+                <a:avLst/>
+              </a:prstGeom>
+            </p:spPr>
+            <p:style>
+              <a:lnRef idx="2">
+                <a:schemeClr val="accent2">
+                  <a:shade val="50000"/>
+                </a:schemeClr>
+              </a:lnRef>
+              <a:fillRef idx="1">
+                <a:schemeClr val="accent2"/>
+              </a:fillRef>
+              <a:effectRef idx="0">
+                <a:schemeClr val="accent2"/>
+              </a:effectRef>
+              <a:fontRef idx="minor">
+                <a:schemeClr val="lt1"/>
+              </a:fontRef>
+            </p:style>
+            <p:txBody>
+              <a:bodyPr rtlCol="0" anchor="ctr"/>
+              <a:lstStyle/>
+              <a:p>
+                <a:pPr algn="ctr"/>
+                <a:r>
+                  <a:rPr lang="de-DE" dirty="0" smtClean="0"/>
+                  <a:t>Blood</a:t>
+                </a:r>
+                <a:endParaRPr lang="en-US" dirty="0"/>
+              </a:p>
+            </p:txBody>
+          </p:sp>
+        </p:grpSp>
+      </p:grpSp>
+    </p:spTree>
+    <p:extLst>
+      <p:ext uri="{BB962C8B-B14F-4D97-AF65-F5344CB8AC3E}">
+        <p14:creationId xmlns:p14="http://schemas.microsoft.com/office/powerpoint/2010/main" val="2313884750"/>
       </p:ext>
     </p:extLst>
   </p:cSld>

</xml_diff>